<commit_message>
edit poster and makefile
</commit_message>
<xml_diff>
--- a/files/Poster Final Project 2022.pptx
+++ b/files/Poster Final Project 2022.pptx
@@ -243,7 +243,7 @@
           <a:p>
             <a:fld id="{73EE89F4-C31D-45E3-BFAA-D8E8790DFB86}" type="datetimeFigureOut">
               <a:rPr lang="en-US" smtClean="0"/>
-              <a:t>5/20/2022</a:t>
+              <a:t>5/22/2022</a:t>
             </a:fld>
             <a:endParaRPr lang="en-US"/>
           </a:p>
@@ -413,7 +413,7 @@
           <a:p>
             <a:fld id="{73EE89F4-C31D-45E3-BFAA-D8E8790DFB86}" type="datetimeFigureOut">
               <a:rPr lang="en-US" smtClean="0"/>
-              <a:t>5/20/2022</a:t>
+              <a:t>5/22/2022</a:t>
             </a:fld>
             <a:endParaRPr lang="en-US"/>
           </a:p>
@@ -593,7 +593,7 @@
           <a:p>
             <a:fld id="{73EE89F4-C31D-45E3-BFAA-D8E8790DFB86}" type="datetimeFigureOut">
               <a:rPr lang="en-US" smtClean="0"/>
-              <a:t>5/20/2022</a:t>
+              <a:t>5/22/2022</a:t>
             </a:fld>
             <a:endParaRPr lang="en-US"/>
           </a:p>
@@ -763,7 +763,7 @@
           <a:p>
             <a:fld id="{73EE89F4-C31D-45E3-BFAA-D8E8790DFB86}" type="datetimeFigureOut">
               <a:rPr lang="en-US" smtClean="0"/>
-              <a:t>5/20/2022</a:t>
+              <a:t>5/22/2022</a:t>
             </a:fld>
             <a:endParaRPr lang="en-US"/>
           </a:p>
@@ -1007,7 +1007,7 @@
           <a:p>
             <a:fld id="{73EE89F4-C31D-45E3-BFAA-D8E8790DFB86}" type="datetimeFigureOut">
               <a:rPr lang="en-US" smtClean="0"/>
-              <a:t>5/20/2022</a:t>
+              <a:t>5/22/2022</a:t>
             </a:fld>
             <a:endParaRPr lang="en-US"/>
           </a:p>
@@ -1239,7 +1239,7 @@
           <a:p>
             <a:fld id="{73EE89F4-C31D-45E3-BFAA-D8E8790DFB86}" type="datetimeFigureOut">
               <a:rPr lang="en-US" smtClean="0"/>
-              <a:t>5/20/2022</a:t>
+              <a:t>5/22/2022</a:t>
             </a:fld>
             <a:endParaRPr lang="en-US"/>
           </a:p>
@@ -1606,7 +1606,7 @@
           <a:p>
             <a:fld id="{73EE89F4-C31D-45E3-BFAA-D8E8790DFB86}" type="datetimeFigureOut">
               <a:rPr lang="en-US" smtClean="0"/>
-              <a:t>5/20/2022</a:t>
+              <a:t>5/22/2022</a:t>
             </a:fld>
             <a:endParaRPr lang="en-US"/>
           </a:p>
@@ -1724,7 +1724,7 @@
           <a:p>
             <a:fld id="{73EE89F4-C31D-45E3-BFAA-D8E8790DFB86}" type="datetimeFigureOut">
               <a:rPr lang="en-US" smtClean="0"/>
-              <a:t>5/20/2022</a:t>
+              <a:t>5/22/2022</a:t>
             </a:fld>
             <a:endParaRPr lang="en-US"/>
           </a:p>
@@ -1819,7 +1819,7 @@
           <a:p>
             <a:fld id="{73EE89F4-C31D-45E3-BFAA-D8E8790DFB86}" type="datetimeFigureOut">
               <a:rPr lang="en-US" smtClean="0"/>
-              <a:t>5/20/2022</a:t>
+              <a:t>5/22/2022</a:t>
             </a:fld>
             <a:endParaRPr lang="en-US"/>
           </a:p>
@@ -2096,7 +2096,7 @@
           <a:p>
             <a:fld id="{73EE89F4-C31D-45E3-BFAA-D8E8790DFB86}" type="datetimeFigureOut">
               <a:rPr lang="en-US" smtClean="0"/>
-              <a:t>5/20/2022</a:t>
+              <a:t>5/22/2022</a:t>
             </a:fld>
             <a:endParaRPr lang="en-US"/>
           </a:p>
@@ -2353,7 +2353,7 @@
           <a:p>
             <a:fld id="{73EE89F4-C31D-45E3-BFAA-D8E8790DFB86}" type="datetimeFigureOut">
               <a:rPr lang="en-US" smtClean="0"/>
-              <a:t>5/20/2022</a:t>
+              <a:t>5/22/2022</a:t>
             </a:fld>
             <a:endParaRPr lang="en-US"/>
           </a:p>
@@ -2566,7 +2566,7 @@
           <a:p>
             <a:fld id="{73EE89F4-C31D-45E3-BFAA-D8E8790DFB86}" type="datetimeFigureOut">
               <a:rPr lang="en-US" smtClean="0"/>
-              <a:t>5/20/2022</a:t>
+              <a:t>5/22/2022</a:t>
             </a:fld>
             <a:endParaRPr lang="en-US"/>
           </a:p>
@@ -3004,7 +3004,7 @@
         </p:style>
         <p:txBody>
           <a:bodyPr>
-            <a:normAutofit fontScale="92500" lnSpcReduction="10000"/>
+            <a:normAutofit fontScale="92500" lnSpcReduction="20000"/>
           </a:bodyPr>
           <a:lstStyle/>
           <a:p>
@@ -3012,7 +3012,7 @@
             <a:br>
               <a:rPr lang="en-US" sz="1307" b="1" dirty="0">
                 <a:solidFill>
-                  <a:srgbClr val="FF0000"/>
+                  <a:schemeClr val="tx1"/>
                 </a:solidFill>
                 <a:latin typeface="Calibri"/>
                 <a:cs typeface="Arial"/>
@@ -3038,27 +3038,47 @@
               <a:t>       </a:t>
             </a:r>
             <a:r>
-              <a:rPr lang="en-US" b="1" dirty="0">
+              <a:rPr lang="en-US" sz="1900" b="1" dirty="0">
                 <a:solidFill>
                   <a:schemeClr val="tx1"/>
                 </a:solidFill>
                 <a:latin typeface="Calibri"/>
                 <a:cs typeface="Arial"/>
               </a:rPr>
-              <a:t>Data Compression – Comparing </a:t>
-            </a:r>
-            <a:r>
-              <a:rPr lang="en-US" b="1" dirty="0" err="1">
+              <a:t>Data Compression – </a:t>
+            </a:r>
+            <a:r>
+              <a:rPr lang="en-US" b="1" dirty="0">
                 <a:solidFill>
                   <a:schemeClr val="tx1"/>
                 </a:solidFill>
                 <a:latin typeface="Calibri"/>
                 <a:cs typeface="Arial"/>
               </a:rPr>
+              <a:t>Comparing</a:t>
+            </a:r>
+            <a:r>
+              <a:rPr lang="en-US" sz="1900" b="1" dirty="0">
+                <a:solidFill>
+                  <a:schemeClr val="tx1"/>
+                </a:solidFill>
+                <a:latin typeface="Calibri"/>
+                <a:cs typeface="Arial"/>
+              </a:rPr>
+              <a:t> </a:t>
+            </a:r>
+            <a:r>
+              <a:rPr lang="en-US" sz="1900" b="1" dirty="0" err="1">
+                <a:solidFill>
+                  <a:schemeClr val="tx1"/>
+                </a:solidFill>
+                <a:latin typeface="Calibri"/>
+                <a:cs typeface="Arial"/>
+              </a:rPr>
               <a:t>Haar’s</a:t>
             </a:r>
             <a:r>
-              <a:rPr lang="en-US" b="1" dirty="0">
+              <a:rPr lang="en-US" sz="1900" b="1" dirty="0">
                 <a:solidFill>
                   <a:schemeClr val="tx1"/>
                 </a:solidFill>
@@ -3178,7 +3198,7 @@
             <a:br>
               <a:rPr lang="en-US" sz="1307" b="1" dirty="0">
                 <a:solidFill>
-                  <a:srgbClr val="FF0000"/>
+                  <a:schemeClr val="tx1"/>
                 </a:solidFill>
                 <a:latin typeface="Calibri"/>
                 <a:cs typeface="Arial"/>
@@ -3186,7 +3206,7 @@
             </a:br>
             <a:endParaRPr lang="he-IL" sz="1307" b="1" dirty="0">
               <a:solidFill>
-                <a:srgbClr val="FF0000"/>
+                <a:schemeClr val="tx1"/>
               </a:solidFill>
               <a:latin typeface="Calibri"/>
               <a:cs typeface="Arial"/>
@@ -3280,7 +3300,149 @@
             <a:pPr>
               <a:defRPr/>
             </a:pPr>
-            <a:endParaRPr lang="en-US" sz="1400" dirty="0">
+            <a:r>
+              <a:rPr lang="en-US" sz="1050" i="0" dirty="0">
+                <a:solidFill>
+                  <a:srgbClr val="202124"/>
+                </a:solidFill>
+                <a:effectLst/>
+                <a:latin typeface="Arial" panose="020B0604020202020204" pitchFamily="34" charset="0"/>
+                <a:cs typeface="Arial" panose="020B0604020202020204" pitchFamily="34" charset="0"/>
+              </a:rPr>
+              <a:t>Data compression is the process of encoding, restructuring or otherwise modifying data in order to reduce its size</a:t>
+            </a:r>
+            <a:r>
+              <a:rPr lang="en-US" sz="1050" i="0" dirty="0">
+                <a:solidFill>
+                  <a:prstClr val="black"/>
+                </a:solidFill>
+                <a:effectLst/>
+                <a:latin typeface="Arial" panose="020B0604020202020204" pitchFamily="34" charset="0"/>
+                <a:ea typeface="Tahoma" pitchFamily="34" charset="0"/>
+                <a:cs typeface="Arial" pitchFamily="34" charset="0"/>
+              </a:rPr>
+              <a:t>.</a:t>
+            </a:r>
+          </a:p>
+          <a:p>
+            <a:pPr>
+              <a:defRPr/>
+            </a:pPr>
+            <a:r>
+              <a:rPr lang="en-US" sz="1050" dirty="0">
+                <a:solidFill>
+                  <a:prstClr val="black"/>
+                </a:solidFill>
+                <a:latin typeface="Arial" panose="020B0604020202020204" pitchFamily="34" charset="0"/>
+                <a:ea typeface="Tahoma" pitchFamily="34" charset="0"/>
+                <a:cs typeface="Arial" pitchFamily="34" charset="0"/>
+              </a:rPr>
+              <a:t>In our </a:t>
+            </a:r>
+            <a:r>
+              <a:rPr lang="en-US" sz="1050" i="0" dirty="0">
+                <a:solidFill>
+                  <a:srgbClr val="202124"/>
+                </a:solidFill>
+                <a:effectLst/>
+                <a:latin typeface="Arial" panose="020B0604020202020204" pitchFamily="34" charset="0"/>
+                <a:cs typeface="Arial" panose="020B0604020202020204" pitchFamily="34" charset="0"/>
+              </a:rPr>
+              <a:t>Data compression </a:t>
+            </a:r>
+            <a:r>
+              <a:rPr lang="en-US" sz="1050" dirty="0">
+                <a:solidFill>
+                  <a:prstClr val="black"/>
+                </a:solidFill>
+                <a:latin typeface="Arial" panose="020B0604020202020204" pitchFamily="34" charset="0"/>
+                <a:ea typeface="Tahoma" pitchFamily="34" charset="0"/>
+                <a:cs typeface="Arial" pitchFamily="34" charset="0"/>
+              </a:rPr>
+              <a:t>research we specified at the </a:t>
+            </a:r>
+            <a:r>
+              <a:rPr lang="en-US" sz="1050" i="0" u="none" strike="noStrike" baseline="0" dirty="0" err="1">
+                <a:latin typeface="Arial" panose="020B0604020202020204" pitchFamily="34" charset="0"/>
+                <a:cs typeface="Arial" panose="020B0604020202020204" pitchFamily="34" charset="0"/>
+              </a:rPr>
+              <a:t>Haar</a:t>
+            </a:r>
+            <a:r>
+              <a:rPr lang="en-US" sz="1050" i="0" u="none" strike="noStrike" baseline="0" dirty="0">
+                <a:latin typeface="Arial" panose="020B0604020202020204" pitchFamily="34" charset="0"/>
+                <a:cs typeface="Arial" panose="020B0604020202020204" pitchFamily="34" charset="0"/>
+              </a:rPr>
+              <a:t> wavelet transform ,which is a simple discrete transform.</a:t>
+            </a:r>
+          </a:p>
+          <a:p>
+            <a:pPr>
+              <a:defRPr/>
+            </a:pPr>
+            <a:r>
+              <a:rPr lang="en-US" sz="1050" dirty="0">
+                <a:solidFill>
+                  <a:prstClr val="black"/>
+                </a:solidFill>
+                <a:latin typeface="Arial" panose="020B0604020202020204" pitchFamily="34" charset="0"/>
+                <a:ea typeface="Tahoma" pitchFamily="34" charset="0"/>
+                <a:cs typeface="Arial" panose="020B0604020202020204" pitchFamily="34" charset="0"/>
+              </a:rPr>
+              <a:t>We compare 2 main </a:t>
+            </a:r>
+            <a:r>
+              <a:rPr lang="en-US" sz="1050" dirty="0" err="1">
+                <a:solidFill>
+                  <a:prstClr val="black"/>
+                </a:solidFill>
+                <a:latin typeface="Arial" panose="020B0604020202020204" pitchFamily="34" charset="0"/>
+                <a:ea typeface="Tahoma" pitchFamily="34" charset="0"/>
+                <a:cs typeface="Arial" panose="020B0604020202020204" pitchFamily="34" charset="0"/>
+              </a:rPr>
+              <a:t>Haar</a:t>
+            </a:r>
+            <a:r>
+              <a:rPr lang="en-US" sz="1050" dirty="0">
+                <a:solidFill>
+                  <a:prstClr val="black"/>
+                </a:solidFill>
+                <a:latin typeface="Arial" panose="020B0604020202020204" pitchFamily="34" charset="0"/>
+                <a:ea typeface="Tahoma" pitchFamily="34" charset="0"/>
+                <a:cs typeface="Arial" panose="020B0604020202020204" pitchFamily="34" charset="0"/>
+              </a:rPr>
+              <a:t> </a:t>
+            </a:r>
+            <a:r>
+              <a:rPr lang="en-US" sz="1050" dirty="0" err="1">
+                <a:solidFill>
+                  <a:prstClr val="black"/>
+                </a:solidFill>
+                <a:latin typeface="Arial" panose="020B0604020202020204" pitchFamily="34" charset="0"/>
+                <a:ea typeface="Tahoma" pitchFamily="34" charset="0"/>
+                <a:cs typeface="Arial" panose="020B0604020202020204" pitchFamily="34" charset="0"/>
+              </a:rPr>
+              <a:t>algorithems</a:t>
+            </a:r>
+            <a:r>
+              <a:rPr lang="en-US" sz="1050" dirty="0">
+                <a:solidFill>
+                  <a:prstClr val="black"/>
+                </a:solidFill>
+                <a:latin typeface="Arial" panose="020B0604020202020204" pitchFamily="34" charset="0"/>
+                <a:ea typeface="Tahoma" pitchFamily="34" charset="0"/>
+                <a:cs typeface="Arial" panose="020B0604020202020204" pitchFamily="34" charset="0"/>
+              </a:rPr>
+              <a:t> which </a:t>
+            </a:r>
+            <a:r>
+              <a:rPr lang="en-US" sz="1050" i="0" u="none" strike="noStrike" baseline="0" dirty="0">
+                <a:latin typeface="Arial" panose="020B0604020202020204" pitchFamily="34" charset="0"/>
+                <a:cs typeface="Arial" panose="020B0604020202020204" pitchFamily="34" charset="0"/>
+              </a:rPr>
+              <a:t>applied for lossless compression of integer sequences.</a:t>
+            </a:r>
+            <a:endParaRPr lang="en-US" sz="1050" dirty="0">
               <a:solidFill>
                 <a:prstClr val="black"/>
               </a:solidFill>
@@ -3294,7 +3456,40 @@
               <a:defRPr/>
             </a:pPr>
             <a:r>
-              <a:rPr lang="en-US" sz="1400" dirty="0">
+              <a:rPr lang="en-US" sz="1050" dirty="0" err="1">
+                <a:solidFill>
+                  <a:prstClr val="black"/>
+                </a:solidFill>
+                <a:latin typeface="Arial" panose="020B0604020202020204" pitchFamily="34" charset="0"/>
+                <a:ea typeface="Tahoma" pitchFamily="34" charset="0"/>
+                <a:cs typeface="Arial" pitchFamily="34" charset="0"/>
+              </a:rPr>
+              <a:t>Haar</a:t>
+            </a:r>
+            <a:r>
+              <a:rPr lang="en-US" sz="1050" dirty="0">
+                <a:solidFill>
+                  <a:prstClr val="black"/>
+                </a:solidFill>
+                <a:latin typeface="Arial" panose="020B0604020202020204" pitchFamily="34" charset="0"/>
+                <a:ea typeface="Tahoma" pitchFamily="34" charset="0"/>
+                <a:cs typeface="Arial" pitchFamily="34" charset="0"/>
+              </a:rPr>
+              <a:t> Integer and </a:t>
+            </a:r>
+            <a:r>
+              <a:rPr lang="en-US" sz="1050" dirty="0" err="1">
+                <a:solidFill>
+                  <a:prstClr val="black"/>
+                </a:solidFill>
+                <a:latin typeface="Arial" panose="020B0604020202020204" pitchFamily="34" charset="0"/>
+                <a:ea typeface="Tahoma" pitchFamily="34" charset="0"/>
+                <a:cs typeface="Arial" pitchFamily="34" charset="0"/>
+              </a:rPr>
+              <a:t>Haar</a:t>
+            </a:r>
+            <a:r>
+              <a:rPr lang="en-US" sz="1050" dirty="0">
                 <a:solidFill>
                   <a:prstClr val="black"/>
                 </a:solidFill>
@@ -3302,7 +3497,7 @@
                 <a:ea typeface="Tahoma" pitchFamily="34" charset="0"/>
                 <a:cs typeface="Arial" pitchFamily="34" charset="0"/>
               </a:rPr>
-              <a:t>Our project subject, is comparing 2 central data compression algorithms:</a:t>
+              <a:t> New Transform.</a:t>
             </a:r>
           </a:p>
           <a:p>
@@ -3310,7 +3505,7 @@
               <a:defRPr/>
             </a:pPr>
             <a:r>
-              <a:rPr lang="en-US" sz="1400" dirty="0" err="1">
+              <a:rPr lang="en-US" sz="1050" dirty="0">
                 <a:solidFill>
                   <a:prstClr val="black"/>
                 </a:solidFill>
@@ -3318,58 +3513,9 @@
                 <a:ea typeface="Tahoma" pitchFamily="34" charset="0"/>
                 <a:cs typeface="Arial" pitchFamily="34" charset="0"/>
               </a:rPr>
-              <a:t>Haar</a:t>
-            </a:r>
-            <a:r>
-              <a:rPr lang="en-US" sz="1400" dirty="0">
-                <a:solidFill>
-                  <a:prstClr val="black"/>
-                </a:solidFill>
-                <a:latin typeface="Arial" pitchFamily="34" charset="0"/>
-                <a:ea typeface="Tahoma" pitchFamily="34" charset="0"/>
-                <a:cs typeface="Arial" pitchFamily="34" charset="0"/>
-              </a:rPr>
-              <a:t> Integer and </a:t>
-            </a:r>
-            <a:r>
-              <a:rPr lang="en-US" sz="1400" dirty="0" err="1">
-                <a:solidFill>
-                  <a:prstClr val="black"/>
-                </a:solidFill>
-                <a:latin typeface="Arial" pitchFamily="34" charset="0"/>
-                <a:ea typeface="Tahoma" pitchFamily="34" charset="0"/>
-                <a:cs typeface="Arial" pitchFamily="34" charset="0"/>
-              </a:rPr>
-              <a:t>Haar</a:t>
-            </a:r>
-            <a:r>
-              <a:rPr lang="en-US" sz="1400" dirty="0">
-                <a:solidFill>
-                  <a:prstClr val="black"/>
-                </a:solidFill>
-                <a:latin typeface="Arial" pitchFamily="34" charset="0"/>
-                <a:ea typeface="Tahoma" pitchFamily="34" charset="0"/>
-                <a:cs typeface="Arial" pitchFamily="34" charset="0"/>
-              </a:rPr>
-              <a:t> New Transform.</a:t>
-            </a:r>
-          </a:p>
-          <a:p>
-            <a:pPr>
-              <a:defRPr/>
-            </a:pPr>
-            <a:r>
-              <a:rPr lang="en-US" sz="1400" dirty="0">
-                <a:solidFill>
-                  <a:prstClr val="black"/>
-                </a:solidFill>
-                <a:latin typeface="Arial" pitchFamily="34" charset="0"/>
-                <a:ea typeface="Tahoma" pitchFamily="34" charset="0"/>
-                <a:cs typeface="Arial" pitchFamily="34" charset="0"/>
-              </a:rPr>
               <a:t>In discover of the optimal algorithms in different aspects.</a:t>
             </a:r>
-            <a:endParaRPr lang="he-IL" sz="1400" dirty="0">
+            <a:endParaRPr lang="he-IL" sz="1050" dirty="0">
               <a:solidFill>
                 <a:prstClr val="black"/>
               </a:solidFill>
@@ -3456,8 +3602,39 @@
               <a:defRPr/>
             </a:pPr>
             <a:r>
-              <a:rPr lang="en-US" sz="1200" dirty="0"/>
-              <a:t>The algorithms we chose are the algorithms we research. </a:t>
+              <a:rPr lang="en-US" sz="1200" dirty="0">
+                <a:latin typeface="Arial" panose="020B0604020202020204" pitchFamily="34" charset="0"/>
+                <a:cs typeface="Arial" panose="020B0604020202020204" pitchFamily="34" charset="0"/>
+              </a:rPr>
+              <a:t>The Method we chose to implement the different </a:t>
+            </a:r>
+            <a:r>
+              <a:rPr lang="en-US" sz="1200" dirty="0" err="1">
+                <a:latin typeface="Arial" panose="020B0604020202020204" pitchFamily="34" charset="0"/>
+                <a:cs typeface="Arial" panose="020B0604020202020204" pitchFamily="34" charset="0"/>
+              </a:rPr>
+              <a:t>Haar</a:t>
+            </a:r>
+            <a:r>
+              <a:rPr lang="en-US" sz="1200" dirty="0">
+                <a:latin typeface="Arial" panose="020B0604020202020204" pitchFamily="34" charset="0"/>
+                <a:cs typeface="Arial" panose="020B0604020202020204" pitchFamily="34" charset="0"/>
+              </a:rPr>
+              <a:t> </a:t>
+            </a:r>
+            <a:r>
+              <a:rPr lang="en-US" sz="1200" dirty="0" err="1">
+                <a:latin typeface="Arial" panose="020B0604020202020204" pitchFamily="34" charset="0"/>
+                <a:cs typeface="Arial" panose="020B0604020202020204" pitchFamily="34" charset="0"/>
+              </a:rPr>
+              <a:t>algorithems</a:t>
+            </a:r>
+            <a:r>
+              <a:rPr lang="en-US" sz="1200" dirty="0">
+                <a:latin typeface="Arial" panose="020B0604020202020204" pitchFamily="34" charset="0"/>
+                <a:cs typeface="Arial" panose="020B0604020202020204" pitchFamily="34" charset="0"/>
+              </a:rPr>
+              <a:t> were based on the article “New Compression Schemes for Natural Number Sequences” by Prof. Dana Shapira.</a:t>
             </a:r>
           </a:p>
           <a:p>
@@ -3465,16 +3642,124 @@
               <a:defRPr/>
             </a:pPr>
             <a:r>
-              <a:rPr lang="en-US" sz="1200" dirty="0"/>
-              <a:t>The method that we selected for our research is reviewing an article that deal with our subject (“New Compression Schemes for Natural Number Sequences” by Prof. Dana Shapira), and analyzed the algorithms that appear in this article</a:t>
-            </a:r>
-          </a:p>
-          <a:p>
-            <a:pPr>
-              <a:defRPr/>
-            </a:pPr>
-            <a:endParaRPr lang="en-US" sz="1200" b="1" dirty="0">
-              <a:latin typeface="Arial" pitchFamily="34" charset="0"/>
+              <a:rPr lang="en-US" sz="1200" dirty="0">
+                <a:latin typeface="Arial" panose="020B0604020202020204" pitchFamily="34" charset="0"/>
+                <a:ea typeface="Tahoma" pitchFamily="34" charset="0"/>
+                <a:cs typeface="Arial" pitchFamily="34" charset="0"/>
+              </a:rPr>
+              <a:t>The method to compare the </a:t>
+            </a:r>
+            <a:r>
+              <a:rPr lang="en-US" sz="1200" b="0" i="0" dirty="0">
+                <a:solidFill>
+                  <a:srgbClr val="333333"/>
+                </a:solidFill>
+                <a:effectLst/>
+                <a:latin typeface="Arial" panose="020B0604020202020204" pitchFamily="34" charset="0"/>
+                <a:cs typeface="Arial" panose="020B0604020202020204" pitchFamily="34" charset="0"/>
+              </a:rPr>
+              <a:t>efficiency</a:t>
+            </a:r>
+            <a:r>
+              <a:rPr lang="en-US" sz="1200" dirty="0">
+                <a:solidFill>
+                  <a:srgbClr val="333333"/>
+                </a:solidFill>
+                <a:latin typeface="Arial" panose="020B0604020202020204" pitchFamily="34" charset="0"/>
+                <a:ea typeface="Tahoma" pitchFamily="34" charset="0"/>
+                <a:cs typeface="Arial" pitchFamily="34" charset="0"/>
+              </a:rPr>
+              <a:t> of the </a:t>
+            </a:r>
+            <a:r>
+              <a:rPr lang="en-US" sz="1200" dirty="0" err="1">
+                <a:solidFill>
+                  <a:srgbClr val="333333"/>
+                </a:solidFill>
+                <a:latin typeface="Arial" panose="020B0604020202020204" pitchFamily="34" charset="0"/>
+                <a:ea typeface="Tahoma" pitchFamily="34" charset="0"/>
+                <a:cs typeface="Arial" pitchFamily="34" charset="0"/>
+              </a:rPr>
+              <a:t>algorihems</a:t>
+            </a:r>
+            <a:r>
+              <a:rPr lang="en-US" sz="1200" dirty="0">
+                <a:solidFill>
+                  <a:srgbClr val="333333"/>
+                </a:solidFill>
+                <a:latin typeface="Arial" panose="020B0604020202020204" pitchFamily="34" charset="0"/>
+                <a:ea typeface="Tahoma" pitchFamily="34" charset="0"/>
+                <a:cs typeface="Arial" pitchFamily="34" charset="0"/>
+              </a:rPr>
+              <a:t> were to measure the bit size </a:t>
+            </a:r>
+            <a:r>
+              <a:rPr lang="en-US" sz="1200" dirty="0" err="1">
+                <a:solidFill>
+                  <a:srgbClr val="333333"/>
+                </a:solidFill>
+                <a:latin typeface="Arial" panose="020B0604020202020204" pitchFamily="34" charset="0"/>
+                <a:ea typeface="Tahoma" pitchFamily="34" charset="0"/>
+                <a:cs typeface="Arial" pitchFamily="34" charset="0"/>
+              </a:rPr>
+              <a:t>compresed</a:t>
+            </a:r>
+            <a:r>
+              <a:rPr lang="en-US" sz="1200" dirty="0">
+                <a:solidFill>
+                  <a:srgbClr val="333333"/>
+                </a:solidFill>
+                <a:latin typeface="Arial" panose="020B0604020202020204" pitchFamily="34" charset="0"/>
+                <a:ea typeface="Tahoma" pitchFamily="34" charset="0"/>
+                <a:cs typeface="Arial" pitchFamily="34" charset="0"/>
+              </a:rPr>
+              <a:t> massage each </a:t>
+            </a:r>
+            <a:r>
+              <a:rPr lang="en-US" sz="1200" dirty="0" err="1">
+                <a:solidFill>
+                  <a:srgbClr val="333333"/>
+                </a:solidFill>
+                <a:latin typeface="Arial" panose="020B0604020202020204" pitchFamily="34" charset="0"/>
+                <a:ea typeface="Tahoma" pitchFamily="34" charset="0"/>
+                <a:cs typeface="Arial" pitchFamily="34" charset="0"/>
+              </a:rPr>
+              <a:t>algorithem</a:t>
+            </a:r>
+            <a:r>
+              <a:rPr lang="en-US" sz="1200" dirty="0">
+                <a:solidFill>
+                  <a:srgbClr val="333333"/>
+                </a:solidFill>
+                <a:latin typeface="Arial" panose="020B0604020202020204" pitchFamily="34" charset="0"/>
+                <a:ea typeface="Tahoma" pitchFamily="34" charset="0"/>
+                <a:cs typeface="Arial" pitchFamily="34" charset="0"/>
+              </a:rPr>
+              <a:t> </a:t>
+            </a:r>
+            <a:r>
+              <a:rPr lang="en-US" sz="1200" b="0" i="0" dirty="0">
+                <a:solidFill>
+                  <a:srgbClr val="333333"/>
+                </a:solidFill>
+                <a:effectLst/>
+                <a:latin typeface="Arial" panose="020B0604020202020204" pitchFamily="34" charset="0"/>
+                <a:cs typeface="Arial" panose="020B0604020202020204" pitchFamily="34" charset="0"/>
+              </a:rPr>
+              <a:t>produce</a:t>
+            </a:r>
+            <a:r>
+              <a:rPr lang="en-US" sz="1200" dirty="0">
+                <a:solidFill>
+                  <a:srgbClr val="333333"/>
+                </a:solidFill>
+                <a:latin typeface="Arial" panose="020B0604020202020204" pitchFamily="34" charset="0"/>
+                <a:cs typeface="Arial" panose="020B0604020202020204" pitchFamily="34" charset="0"/>
+              </a:rPr>
+              <a:t>d</a:t>
+            </a:r>
+            <a:endParaRPr lang="en-US" sz="1200" dirty="0">
+              <a:latin typeface="Arial" panose="020B0604020202020204" pitchFamily="34" charset="0"/>
               <a:ea typeface="Tahoma" pitchFamily="34" charset="0"/>
               <a:cs typeface="Arial" pitchFamily="34" charset="0"/>
             </a:endParaRPr>
@@ -3583,9 +3868,150 @@
             <a:pPr algn="l">
               <a:defRPr/>
             </a:pPr>
+            <a:r>
+              <a:rPr lang="en-US" sz="1200" dirty="0">
+                <a:solidFill>
+                  <a:schemeClr val="tx1"/>
+                </a:solidFill>
+                <a:latin typeface="Arial" pitchFamily="34" charset="0"/>
+                <a:ea typeface="Tahoma" pitchFamily="34" charset="0"/>
+                <a:cs typeface="Arial" pitchFamily="34" charset="0"/>
+              </a:rPr>
+              <a:t>The </a:t>
+            </a:r>
+            <a:r>
+              <a:rPr lang="en-US" sz="1200" dirty="0" err="1">
+                <a:solidFill>
+                  <a:schemeClr val="tx1"/>
+                </a:solidFill>
+                <a:latin typeface="Arial" pitchFamily="34" charset="0"/>
+                <a:ea typeface="Tahoma" pitchFamily="34" charset="0"/>
+                <a:cs typeface="Arial" pitchFamily="34" charset="0"/>
+              </a:rPr>
+              <a:t>Haar</a:t>
+            </a:r>
+            <a:r>
+              <a:rPr lang="en-US" sz="1200" dirty="0">
+                <a:solidFill>
+                  <a:schemeClr val="tx1"/>
+                </a:solidFill>
+                <a:latin typeface="Arial" pitchFamily="34" charset="0"/>
+                <a:ea typeface="Tahoma" pitchFamily="34" charset="0"/>
+                <a:cs typeface="Arial" pitchFamily="34" charset="0"/>
+              </a:rPr>
+              <a:t> </a:t>
+            </a:r>
+            <a:r>
+              <a:rPr lang="en-US" sz="1200" dirty="0" err="1">
+                <a:solidFill>
+                  <a:schemeClr val="tx1"/>
+                </a:solidFill>
+                <a:latin typeface="Arial" pitchFamily="34" charset="0"/>
+                <a:ea typeface="Tahoma" pitchFamily="34" charset="0"/>
+                <a:cs typeface="Arial" pitchFamily="34" charset="0"/>
+              </a:rPr>
+              <a:t>algorithems</a:t>
+            </a:r>
+            <a:r>
+              <a:rPr lang="en-US" sz="1200" dirty="0">
+                <a:solidFill>
+                  <a:schemeClr val="tx1"/>
+                </a:solidFill>
+                <a:latin typeface="Arial" pitchFamily="34" charset="0"/>
+                <a:ea typeface="Tahoma" pitchFamily="34" charset="0"/>
+                <a:cs typeface="Arial" pitchFamily="34" charset="0"/>
+              </a:rPr>
+              <a:t> </a:t>
+            </a:r>
+            <a:r>
+              <a:rPr lang="en-US" sz="1200" i="0" dirty="0">
+                <a:solidFill>
+                  <a:schemeClr val="tx1"/>
+                </a:solidFill>
+                <a:effectLst/>
+                <a:latin typeface="Assistant" pitchFamily="2" charset="-79"/>
+                <a:cs typeface="Assistant" pitchFamily="2" charset="-79"/>
+              </a:rPr>
+              <a:t>outcome were </a:t>
+            </a:r>
+            <a:r>
+              <a:rPr lang="en-US" sz="1200" i="0" dirty="0" err="1">
+                <a:solidFill>
+                  <a:schemeClr val="tx1"/>
+                </a:solidFill>
+                <a:effectLst/>
+                <a:latin typeface="Assistant" pitchFamily="2" charset="-79"/>
+                <a:cs typeface="Assistant" pitchFamily="2" charset="-79"/>
+              </a:rPr>
+              <a:t>compresed</a:t>
+            </a:r>
+            <a:r>
+              <a:rPr lang="en-US" sz="1200" i="0" dirty="0">
+                <a:solidFill>
+                  <a:schemeClr val="tx1"/>
+                </a:solidFill>
+                <a:effectLst/>
+                <a:latin typeface="Assistant" pitchFamily="2" charset="-79"/>
+                <a:cs typeface="Assistant" pitchFamily="2" charset="-79"/>
+              </a:rPr>
+              <a:t> by several different </a:t>
+            </a:r>
+            <a:r>
+              <a:rPr lang="en-US" sz="1200" i="0" dirty="0" err="1">
+                <a:solidFill>
+                  <a:schemeClr val="tx1"/>
+                </a:solidFill>
+                <a:effectLst/>
+                <a:latin typeface="Assistant" pitchFamily="2" charset="-79"/>
+                <a:cs typeface="Assistant" pitchFamily="2" charset="-79"/>
+              </a:rPr>
+              <a:t>compertion</a:t>
+            </a:r>
+            <a:r>
+              <a:rPr lang="en-US" sz="1200" i="0" dirty="0">
+                <a:solidFill>
+                  <a:schemeClr val="tx1"/>
+                </a:solidFill>
+                <a:effectLst/>
+                <a:latin typeface="Assistant" pitchFamily="2" charset="-79"/>
+                <a:cs typeface="Assistant" pitchFamily="2" charset="-79"/>
+              </a:rPr>
+              <a:t> </a:t>
+            </a:r>
+            <a:r>
+              <a:rPr lang="en-US" sz="1200" i="0" dirty="0" err="1">
+                <a:solidFill>
+                  <a:schemeClr val="tx1"/>
+                </a:solidFill>
+                <a:effectLst/>
+                <a:latin typeface="Assistant" pitchFamily="2" charset="-79"/>
+                <a:cs typeface="Assistant" pitchFamily="2" charset="-79"/>
+              </a:rPr>
+              <a:t>algorithems</a:t>
+            </a:r>
+            <a:r>
+              <a:rPr lang="en-US" sz="1200" i="0" dirty="0">
+                <a:solidFill>
+                  <a:schemeClr val="tx1"/>
+                </a:solidFill>
+                <a:effectLst/>
+                <a:latin typeface="Assistant" pitchFamily="2" charset="-79"/>
+                <a:cs typeface="Assistant" pitchFamily="2" charset="-79"/>
+              </a:rPr>
+              <a:t> such as : Elias code </a:t>
+            </a:r>
+            <a:r>
+              <a:rPr lang="en-US" sz="1200" i="0" u="none" strike="noStrike" baseline="0" dirty="0">
+                <a:solidFill>
+                  <a:schemeClr val="tx1"/>
+                </a:solidFill>
+                <a:latin typeface="CambriaMath"/>
+              </a:rPr>
+              <a:t>𝑪𝜹 , binary coding and unary coding</a:t>
+            </a:r>
             <a:endParaRPr lang="en-US" sz="1200" dirty="0">
               <a:solidFill>
-                <a:prstClr val="black"/>
+                <a:schemeClr val="tx1"/>
               </a:solidFill>
               <a:latin typeface="Arial" pitchFamily="34" charset="0"/>
               <a:ea typeface="Tahoma" pitchFamily="34" charset="0"/>
@@ -3605,7 +4031,7 @@
                 <a:ea typeface="Tahoma" pitchFamily="34" charset="0"/>
                 <a:cs typeface="Arial" pitchFamily="34" charset="0"/>
               </a:rPr>
-              <a:t>We implemented C++ program, that compares between the algorithms, by the  byte’s number of the compress data, </a:t>
+              <a:t>All the implementation were made in C</a:t>
             </a:r>
             <a:r>
               <a:rPr lang="en-US" sz="1200">
@@ -3616,18 +4042,7 @@
                 <a:ea typeface="Tahoma" pitchFamily="34" charset="0"/>
                 <a:cs typeface="Arial" pitchFamily="34" charset="0"/>
               </a:rPr>
-              <a:t>from the different </a:t>
-            </a:r>
-            <a:r>
-              <a:rPr lang="en-US" sz="1200" dirty="0">
-                <a:solidFill>
-                  <a:prstClr val="black"/>
-                </a:solidFill>
-                <a:latin typeface="Arial" pitchFamily="34" charset="0"/>
-                <a:ea typeface="Tahoma" pitchFamily="34" charset="0"/>
-                <a:cs typeface="Arial" pitchFamily="34" charset="0"/>
-              </a:rPr>
-              <a:t>algorithms</a:t>
+              <a:t>++ </a:t>
             </a:r>
             <a:endParaRPr lang="he-IL" sz="1200" dirty="0">
               <a:solidFill>
@@ -4034,7 +4449,7 @@
             </a:pPr>
             <a:r>
               <a:rPr lang="en-US" sz="1600" dirty="0"/>
-              <a:t>Contribution/project goal:</a:t>
+              <a:t>Contribution/project goal:   </a:t>
             </a:r>
           </a:p>
           <a:p>
@@ -4042,25 +4457,36 @@
               <a:defRPr/>
             </a:pPr>
             <a:r>
-              <a:rPr lang="en-US" sz="1600" dirty="0"/>
-              <a:t>      </a:t>
-            </a:r>
-          </a:p>
-          <a:p>
-            <a:pPr>
-              <a:defRPr/>
-            </a:pPr>
-            <a:r>
-              <a:rPr lang="en-US" sz="1600" dirty="0">
+              <a:rPr lang="en-US" sz="1400" dirty="0">
                 <a:solidFill>
                   <a:prstClr val="black"/>
                 </a:solidFill>
                 <a:latin typeface="Arial" pitchFamily="34" charset="0"/>
                 <a:ea typeface="Tahoma" pitchFamily="34" charset="0"/>
               </a:rPr>
-              <a:t>Discover optimal algorithms of data compression</a:t>
-            </a:r>
-            <a:endParaRPr lang="he-IL" sz="1600" dirty="0">
+              <a:t>Compare between different </a:t>
+            </a:r>
+            <a:r>
+              <a:rPr lang="en-US" sz="1400" dirty="0" err="1">
+                <a:solidFill>
+                  <a:prstClr val="black"/>
+                </a:solidFill>
+                <a:latin typeface="Arial" pitchFamily="34" charset="0"/>
+                <a:ea typeface="Tahoma" pitchFamily="34" charset="0"/>
+              </a:rPr>
+              <a:t>Haar</a:t>
+            </a:r>
+            <a:r>
+              <a:rPr lang="en-US" sz="1400" dirty="0">
+                <a:solidFill>
+                  <a:prstClr val="black"/>
+                </a:solidFill>
+                <a:latin typeface="Arial" pitchFamily="34" charset="0"/>
+                <a:ea typeface="Tahoma" pitchFamily="34" charset="0"/>
+              </a:rPr>
+              <a:t> algorithms in data compression and Discover the optimal one</a:t>
+            </a:r>
+            <a:endParaRPr lang="he-IL" sz="1400" dirty="0">
               <a:solidFill>
                 <a:prstClr val="black"/>
               </a:solidFill>
@@ -4170,36 +4596,6 @@
           </a:p>
         </p:txBody>
       </p:sp>
-      <p:pic>
-        <p:nvPicPr>
-          <p:cNvPr id="11" name="Picture 10">
-            <a:extLst>
-              <a:ext uri="{FF2B5EF4-FFF2-40B4-BE49-F238E27FC236}">
-                <a16:creationId xmlns:a16="http://schemas.microsoft.com/office/drawing/2014/main" id="{D64C4E1C-6FAC-4FBD-8F18-F52604BE0CA8}"/>
-              </a:ext>
-            </a:extLst>
-          </p:cNvPr>
-          <p:cNvPicPr>
-            <a:picLocks noChangeAspect="1"/>
-          </p:cNvPicPr>
-          <p:nvPr/>
-        </p:nvPicPr>
-        <p:blipFill>
-          <a:blip r:embed="rId2"/>
-          <a:stretch>
-            <a:fillRect/>
-          </a:stretch>
-        </p:blipFill>
-        <p:spPr>
-          <a:xfrm>
-            <a:off x="5703396" y="9279979"/>
-            <a:ext cx="456453" cy="467864"/>
-          </a:xfrm>
-          <a:prstGeom prst="rect">
-            <a:avLst/>
-          </a:prstGeom>
-        </p:spPr>
-      </p:pic>
       <p:sp>
         <p:nvSpPr>
           <p:cNvPr id="2" name="Rectangle 1">
@@ -4214,8 +4610,8 @@
         </p:nvSpPr>
         <p:spPr>
           <a:xfrm>
-            <a:off x="6114757" y="190326"/>
-            <a:ext cx="623538" cy="555884"/>
+            <a:off x="5940055" y="240873"/>
+            <a:ext cx="845495" cy="727874"/>
           </a:xfrm>
           <a:prstGeom prst="rect">
             <a:avLst/>
@@ -4308,15 +4704,51 @@
       </p:sp>
       <p:pic>
         <p:nvPicPr>
-          <p:cNvPr id="1026" name="Picture 2" descr="Image title">
+          <p:cNvPr id="6" name="תמונה 5">
             <a:extLst>
               <a:ext uri="{FF2B5EF4-FFF2-40B4-BE49-F238E27FC236}">
-                <a16:creationId xmlns:a16="http://schemas.microsoft.com/office/drawing/2014/main" id="{4A87B5F7-01E2-5E8F-9C0B-6B1CCD69BBDC}"/>
+                <a16:creationId xmlns:a16="http://schemas.microsoft.com/office/drawing/2014/main" id="{E6E5B8AC-6650-0A12-96E1-68DED619F65F}"/>
               </a:ext>
             </a:extLst>
           </p:cNvPr>
           <p:cNvPicPr>
-            <a:picLocks noChangeAspect="1" noChangeArrowheads="1"/>
+            <a:picLocks noChangeAspect="1"/>
+          </p:cNvPicPr>
+          <p:nvPr/>
+        </p:nvPicPr>
+        <p:blipFill>
+          <a:blip r:embed="rId2">
+            <a:extLst>
+              <a:ext uri="{28A0092B-C50C-407E-A947-70E740481C1C}">
+                <a14:useLocalDpi xmlns:a14="http://schemas.microsoft.com/office/drawing/2010/main" val="0"/>
+              </a:ext>
+            </a:extLst>
+          </a:blip>
+          <a:stretch>
+            <a:fillRect/>
+          </a:stretch>
+        </p:blipFill>
+        <p:spPr>
+          <a:xfrm>
+            <a:off x="0" y="85641"/>
+            <a:ext cx="1158240" cy="883105"/>
+          </a:xfrm>
+          <a:prstGeom prst="rect">
+            <a:avLst/>
+          </a:prstGeom>
+        </p:spPr>
+      </p:pic>
+      <p:pic>
+        <p:nvPicPr>
+          <p:cNvPr id="19" name="תמונה 18">
+            <a:extLst>
+              <a:ext uri="{FF2B5EF4-FFF2-40B4-BE49-F238E27FC236}">
+                <a16:creationId xmlns:a16="http://schemas.microsoft.com/office/drawing/2014/main" id="{C73F2B34-3D9E-0918-6D79-A9E4F2151378}"/>
+              </a:ext>
+            </a:extLst>
+          </p:cNvPr>
+          <p:cNvPicPr>
+            <a:picLocks noChangeAspect="1"/>
           </p:cNvPicPr>
           <p:nvPr/>
         </p:nvPicPr>
@@ -4328,29 +4760,18 @@
               </a:ext>
             </a:extLst>
           </a:blip>
-          <a:srcRect/>
           <a:stretch>
             <a:fillRect/>
           </a:stretch>
         </p:blipFill>
-        <p:spPr bwMode="auto">
+        <p:spPr>
           <a:xfrm>
-            <a:off x="119705" y="32925"/>
-            <a:ext cx="1119472" cy="935822"/>
+            <a:off x="5706123" y="9314163"/>
+            <a:ext cx="467864" cy="467864"/>
           </a:xfrm>
           <a:prstGeom prst="rect">
             <a:avLst/>
           </a:prstGeom>
-          <a:noFill/>
-          <a:extLst>
-            <a:ext uri="{909E8E84-426E-40DD-AFC4-6F175D3DCCD1}">
-              <a14:hiddenFill xmlns:a14="http://schemas.microsoft.com/office/drawing/2010/main">
-                <a:solidFill>
-                  <a:srgbClr val="FFFFFF"/>
-                </a:solidFill>
-              </a14:hiddenFill>
-            </a:ext>
-          </a:extLst>
         </p:spPr>
       </p:pic>
     </p:spTree>

</xml_diff>

<commit_message>
edir poster with diagrams
</commit_message>
<xml_diff>
--- a/files/Poster Final Project 2022.pptx
+++ b/files/Poster Final Project 2022.pptx
@@ -2984,7 +2984,7 @@
         <p:spPr>
           <a:xfrm>
             <a:off x="1" y="0"/>
-            <a:ext cx="6857999" cy="1283749"/>
+            <a:ext cx="6857999" cy="1283747"/>
           </a:xfrm>
           <a:ln/>
         </p:spPr>
@@ -3249,8 +3249,8 @@
         </p:nvSpPr>
         <p:spPr>
           <a:xfrm>
-            <a:off x="3554669" y="1306524"/>
-            <a:ext cx="3230880" cy="2327963"/>
+            <a:off x="3554669" y="1306525"/>
+            <a:ext cx="3230880" cy="2154928"/>
           </a:xfrm>
           <a:prstGeom prst="roundRect">
             <a:avLst/>
@@ -3347,7 +3347,7 @@
               </a:spcAft>
             </a:pPr>
             <a:r>
-              <a:rPr lang="en-US" sz="1100" b="0" i="0" dirty="0">
+              <a:rPr lang="en-US" sz="1050" b="0" i="0" dirty="0">
                 <a:solidFill>
                   <a:srgbClr val="202124"/>
                 </a:solidFill>
@@ -3357,7 +3357,7 @@
               <a:t>Data compression is the process of encoding, restructuring, or otherwise modifying data in order to reduce its size</a:t>
             </a:r>
             <a:r>
-              <a:rPr lang="en-US" sz="1100" b="0" i="0" dirty="0">
+              <a:rPr lang="en-US" sz="1050" b="0" i="0" dirty="0">
                 <a:solidFill>
                   <a:srgbClr val="000000"/>
                 </a:solidFill>
@@ -3366,7 +3366,7 @@
               </a:rPr>
               <a:t>.</a:t>
             </a:r>
-            <a:endParaRPr lang="en-US" sz="1100" b="0" i="0" dirty="0">
+            <a:endParaRPr lang="en-US" sz="1050" b="0" i="0" dirty="0">
               <a:solidFill>
                 <a:srgbClr val="222222"/>
               </a:solidFill>
@@ -3384,7 +3384,7 @@
               </a:spcAft>
             </a:pPr>
             <a:r>
-              <a:rPr lang="en-US" sz="1100" b="0" i="0" dirty="0">
+              <a:rPr lang="en-US" sz="1050" b="0" i="0" dirty="0">
                 <a:solidFill>
                   <a:srgbClr val="000000"/>
                 </a:solidFill>
@@ -3394,7 +3394,7 @@
               <a:t>In our </a:t>
             </a:r>
             <a:r>
-              <a:rPr lang="en-US" sz="1100" b="0" i="0" dirty="0">
+              <a:rPr lang="en-US" sz="1050" b="0" i="0" dirty="0">
                 <a:solidFill>
                   <a:srgbClr val="202124"/>
                 </a:solidFill>
@@ -3404,7 +3404,7 @@
               <a:t>Data compression </a:t>
             </a:r>
             <a:r>
-              <a:rPr lang="en-US" sz="1100" b="0" i="0" dirty="0">
+              <a:rPr lang="en-US" sz="1050" b="0" i="0" dirty="0">
                 <a:solidFill>
                   <a:srgbClr val="000000"/>
                 </a:solidFill>
@@ -3413,7 +3413,7 @@
               </a:rPr>
               <a:t>research, we specified the Haar wavelet transform, which is a simple discrete transform.</a:t>
             </a:r>
-            <a:endParaRPr lang="en-US" sz="1100" b="0" i="0" dirty="0">
+            <a:endParaRPr lang="en-US" sz="1050" b="0" i="0" dirty="0">
               <a:solidFill>
                 <a:srgbClr val="222222"/>
               </a:solidFill>
@@ -3431,7 +3431,7 @@
               </a:spcAft>
             </a:pPr>
             <a:r>
-              <a:rPr lang="en-US" sz="1100" b="0" i="0" dirty="0">
+              <a:rPr lang="en-US" sz="1050" b="0" i="0" dirty="0">
                 <a:solidFill>
                   <a:srgbClr val="000000"/>
                 </a:solidFill>
@@ -3440,7 +3440,7 @@
               </a:rPr>
               <a:t>We compare the compression performance of two main Haar algorithms applied for lossless compression of integer sequences.</a:t>
             </a:r>
-            <a:endParaRPr lang="en-US" sz="1100" b="0" i="0" dirty="0">
+            <a:endParaRPr lang="en-US" sz="1050" b="0" i="0" dirty="0">
               <a:solidFill>
                 <a:srgbClr val="222222"/>
               </a:solidFill>
@@ -3458,7 +3458,7 @@
               </a:spcAft>
             </a:pPr>
             <a:r>
-              <a:rPr lang="en-US" sz="1100" b="0" i="1" dirty="0">
+              <a:rPr lang="en-US" sz="1050" b="0" i="1" dirty="0">
                 <a:solidFill>
                   <a:srgbClr val="000000"/>
                 </a:solidFill>
@@ -3468,7 +3468,7 @@
               <a:t>Haar Integer </a:t>
             </a:r>
             <a:r>
-              <a:rPr lang="en-US" sz="1100" b="0" i="0" dirty="0">
+              <a:rPr lang="en-US" sz="1050" b="0" i="0" dirty="0">
                 <a:solidFill>
                   <a:srgbClr val="000000"/>
                 </a:solidFill>
@@ -3478,7 +3478,7 @@
               <a:t>and </a:t>
             </a:r>
             <a:r>
-              <a:rPr lang="en-US" sz="1100" b="0" i="1" dirty="0">
+              <a:rPr lang="en-US" sz="1050" b="0" i="1" dirty="0">
                 <a:solidFill>
                   <a:srgbClr val="000000"/>
                 </a:solidFill>
@@ -3488,7 +3488,7 @@
               <a:t>Haar New Transform</a:t>
             </a:r>
             <a:r>
-              <a:rPr lang="en-US" sz="1100" b="0" i="0" dirty="0">
+              <a:rPr lang="en-US" sz="1050" b="0" i="0" dirty="0">
                 <a:solidFill>
                   <a:srgbClr val="000000"/>
                 </a:solidFill>
@@ -3497,7 +3497,7 @@
               </a:rPr>
               <a:t>.</a:t>
             </a:r>
-            <a:endParaRPr lang="en-US" sz="1100" b="0" i="0" dirty="0">
+            <a:endParaRPr lang="en-US" sz="1050" b="0" i="0" dirty="0">
               <a:solidFill>
                 <a:srgbClr val="222222"/>
               </a:solidFill>
@@ -3515,7 +3515,7 @@
         </p:nvSpPr>
         <p:spPr>
           <a:xfrm>
-            <a:off x="72451" y="3324859"/>
+            <a:off x="82404" y="3191636"/>
             <a:ext cx="2929204" cy="2517852"/>
           </a:xfrm>
           <a:prstGeom prst="roundRect">
@@ -3834,8 +3834,8 @@
         </p:nvSpPr>
         <p:spPr>
           <a:xfrm>
-            <a:off x="3141382" y="3857549"/>
-            <a:ext cx="3686927" cy="2341578"/>
+            <a:off x="3141382" y="3681209"/>
+            <a:ext cx="3686927" cy="2154928"/>
           </a:xfrm>
           <a:prstGeom prst="roundRect">
             <a:avLst/>
@@ -3950,8 +3950,8 @@
         </p:nvSpPr>
         <p:spPr>
           <a:xfrm>
-            <a:off x="166597" y="6399415"/>
-            <a:ext cx="6524805" cy="3470344"/>
+            <a:off x="99292" y="6006504"/>
+            <a:ext cx="6703145" cy="3943348"/>
           </a:xfrm>
           <a:prstGeom prst="roundRect">
             <a:avLst/>
@@ -4041,7 +4041,7 @@
         </p:nvSpPr>
         <p:spPr>
           <a:xfrm>
-            <a:off x="5556292" y="9124806"/>
+            <a:off x="5695404" y="9276783"/>
             <a:ext cx="750659" cy="209609"/>
           </a:xfrm>
           <a:prstGeom prst="rect">
@@ -4139,7 +4139,7 @@
         </p:nvSpPr>
         <p:spPr>
           <a:xfrm rot="10800000">
-            <a:off x="2980026" y="3347632"/>
+            <a:off x="2877095" y="3135956"/>
             <a:ext cx="677573" cy="336883"/>
           </a:xfrm>
           <a:prstGeom prst="rightArrow">
@@ -4190,7 +4190,7 @@
         </p:nvSpPr>
         <p:spPr>
           <a:xfrm rot="16200000">
-            <a:off x="4754479" y="3604407"/>
+            <a:off x="4773800" y="3429134"/>
             <a:ext cx="200287" cy="260445"/>
           </a:xfrm>
           <a:prstGeom prst="leftArrow">
@@ -4241,8 +4241,8 @@
         </p:nvSpPr>
         <p:spPr>
           <a:xfrm>
-            <a:off x="1211580" y="5883447"/>
-            <a:ext cx="184328" cy="402890"/>
+            <a:off x="1211580" y="5709488"/>
+            <a:ext cx="374849" cy="297016"/>
           </a:xfrm>
           <a:prstGeom prst="downArrow">
             <a:avLst/>
@@ -4292,8 +4292,8 @@
         </p:nvSpPr>
         <p:spPr>
           <a:xfrm>
-            <a:off x="121537" y="1375548"/>
-            <a:ext cx="3004541" cy="1749023"/>
+            <a:off x="121537" y="1375549"/>
+            <a:ext cx="3004541" cy="1692730"/>
           </a:xfrm>
           <a:prstGeom prst="roundRect">
             <a:avLst/>
@@ -4385,7 +4385,7 @@
         </p:nvCxnSpPr>
         <p:spPr>
           <a:xfrm>
-            <a:off x="5219312" y="9513911"/>
+            <a:off x="5331699" y="9669471"/>
             <a:ext cx="437261" cy="0"/>
           </a:xfrm>
           <a:prstGeom prst="straightConnector1">
@@ -4531,7 +4531,7 @@
           <p:nvPr/>
         </p:nvPicPr>
         <p:blipFill>
-          <a:blip r:embed="rId2">
+          <a:blip r:embed="rId3">
             <a:extLst>
               <a:ext uri="{28A0092B-C50C-407E-A947-70E740481C1C}">
                 <a14:useLocalDpi xmlns:a14="http://schemas.microsoft.com/office/drawing/2010/main" val="0"/>
@@ -4544,7 +4544,7 @@
         </p:blipFill>
         <p:spPr>
           <a:xfrm>
-            <a:off x="5706123" y="9314163"/>
+            <a:off x="5836802" y="9454826"/>
             <a:ext cx="467864" cy="467864"/>
           </a:xfrm>
           <a:prstGeom prst="rect">
@@ -4567,14 +4567,14 @@
           <p:nvPr/>
         </p:nvPicPr>
         <p:blipFill>
-          <a:blip r:embed="rId3"/>
+          <a:blip r:embed="rId4"/>
           <a:stretch>
             <a:fillRect/>
           </a:stretch>
         </p:blipFill>
         <p:spPr>
           <a:xfrm>
-            <a:off x="3173486" y="4413540"/>
+            <a:off x="3173486" y="4191126"/>
             <a:ext cx="1912862" cy="1469906"/>
           </a:xfrm>
           <a:prstGeom prst="rect">
@@ -4597,249 +4597,6 @@
           <p:nvPr/>
         </p:nvPicPr>
         <p:blipFill>
-          <a:blip r:embed="rId4"/>
-          <a:stretch>
-            <a:fillRect/>
-          </a:stretch>
-        </p:blipFill>
-        <p:spPr>
-          <a:xfrm>
-            <a:off x="4964353" y="4442386"/>
-            <a:ext cx="1851906" cy="1450419"/>
-          </a:xfrm>
-          <a:prstGeom prst="rect">
-            <a:avLst/>
-          </a:prstGeom>
-        </p:spPr>
-      </p:pic>
-      <p:sp>
-        <p:nvSpPr>
-          <p:cNvPr id="24" name="תיבת טקסט 23">
-            <a:extLst>
-              <a:ext uri="{FF2B5EF4-FFF2-40B4-BE49-F238E27FC236}">
-                <a16:creationId xmlns:a16="http://schemas.microsoft.com/office/drawing/2014/main" id="{6AC2373D-D0B4-FDB4-7211-627A5538DE79}"/>
-              </a:ext>
-            </a:extLst>
-          </p:cNvPr>
-          <p:cNvSpPr txBox="1"/>
-          <p:nvPr/>
-        </p:nvSpPr>
-        <p:spPr>
-          <a:xfrm>
-            <a:off x="1926877" y="6325400"/>
-            <a:ext cx="4241854" cy="2970044"/>
-          </a:xfrm>
-          <a:prstGeom prst="rect">
-            <a:avLst/>
-          </a:prstGeom>
-          <a:noFill/>
-        </p:spPr>
-        <p:txBody>
-          <a:bodyPr wrap="square" rtlCol="0">
-            <a:spAutoFit/>
-          </a:bodyPr>
-          <a:lstStyle/>
-          <a:p>
-            <a:pPr marL="0" rtl="0" latinLnBrk="0">
-              <a:spcBef>
-                <a:spcPts val="0"/>
-              </a:spcBef>
-              <a:spcAft>
-                <a:spcPts val="0"/>
-              </a:spcAft>
-            </a:pPr>
-            <a:r>
-              <a:rPr lang="en-US" sz="1100" dirty="0">
-                <a:effectLst/>
-                <a:latin typeface="Arial" panose="020B0604020202020204" pitchFamily="34" charset="0"/>
-              </a:rPr>
-              <a:t>We had various outcomes, each type of data that we use while examining the size of the compressed message gave a different answer. </a:t>
-            </a:r>
-            <a:endParaRPr lang="en-US" sz="1100" dirty="0">
-              <a:effectLst/>
-            </a:endParaRPr>
-          </a:p>
-          <a:p>
-            <a:pPr marL="0" rtl="0" latinLnBrk="0">
-              <a:spcBef>
-                <a:spcPts val="0"/>
-              </a:spcBef>
-              <a:spcAft>
-                <a:spcPts val="0"/>
-              </a:spcAft>
-            </a:pPr>
-            <a:r>
-              <a:rPr lang="en-US" sz="1100" dirty="0">
-                <a:effectLst/>
-                <a:latin typeface="Arial" panose="020B0604020202020204" pitchFamily="34" charset="0"/>
-              </a:rPr>
-              <a:t>In the program that creates random numbers and sorts them in an array, each time we used a different compression algorithm.</a:t>
-            </a:r>
-            <a:br>
-              <a:rPr lang="en-US" sz="1100" dirty="0">
-                <a:effectLst/>
-                <a:latin typeface="Arial" panose="020B0604020202020204" pitchFamily="34" charset="0"/>
-              </a:rPr>
-            </a:br>
-            <a:r>
-              <a:rPr lang="en-US" sz="1100" dirty="0">
-                <a:effectLst/>
-                <a:latin typeface="Arial" panose="020B0604020202020204" pitchFamily="34" charset="0"/>
-              </a:rPr>
-              <a:t>when we used the unary coding, the result shows that the Haar Integer will be more efficient in almost 100% of the attempts</a:t>
-            </a:r>
-            <a:endParaRPr lang="en-US" sz="1100" dirty="0">
-              <a:effectLst/>
-            </a:endParaRPr>
-          </a:p>
-          <a:p>
-            <a:pPr marL="0" rtl="0" latinLnBrk="0">
-              <a:spcBef>
-                <a:spcPts val="0"/>
-              </a:spcBef>
-              <a:spcAft>
-                <a:spcPts val="0"/>
-              </a:spcAft>
-            </a:pPr>
-            <a:r>
-              <a:rPr lang="en-US" sz="1100" dirty="0">
-                <a:effectLst/>
-                <a:latin typeface="Arial" panose="020B0604020202020204" pitchFamily="34" charset="0"/>
-              </a:rPr>
-              <a:t>when we used the binary coding, the result shows that the Haar Integer and the </a:t>
-            </a:r>
-            <a:r>
-              <a:rPr lang="en-US" sz="1100" dirty="0" err="1">
-                <a:effectLst/>
-                <a:latin typeface="Arial" panose="020B0604020202020204" pitchFamily="34" charset="0"/>
-              </a:rPr>
-              <a:t>Haar</a:t>
-            </a:r>
-            <a:r>
-              <a:rPr lang="en-US" sz="1100" dirty="0">
-                <a:effectLst/>
-                <a:latin typeface="Arial" panose="020B0604020202020204" pitchFamily="34" charset="0"/>
-              </a:rPr>
-              <a:t> </a:t>
-            </a:r>
-            <a:r>
-              <a:rPr lang="en-US" sz="1100" dirty="0">
-                <a:latin typeface="Arial" panose="020B0604020202020204" pitchFamily="34" charset="0"/>
-              </a:rPr>
-              <a:t>new transform</a:t>
-            </a:r>
-            <a:r>
-              <a:rPr lang="en-US" sz="1100" dirty="0">
-                <a:effectLst/>
-                <a:latin typeface="Arial" panose="020B0604020202020204" pitchFamily="34" charset="0"/>
-              </a:rPr>
-              <a:t> had the same bit size compressed massage for all the attempts.</a:t>
-            </a:r>
-            <a:endParaRPr lang="en-US" sz="1100" dirty="0">
-              <a:effectLst/>
-            </a:endParaRPr>
-          </a:p>
-          <a:p>
-            <a:pPr marL="0" rtl="0" latinLnBrk="0">
-              <a:spcBef>
-                <a:spcPts val="0"/>
-              </a:spcBef>
-              <a:spcAft>
-                <a:spcPts val="0"/>
-              </a:spcAft>
-            </a:pPr>
-            <a:r>
-              <a:rPr lang="en-US" sz="1100" dirty="0">
-                <a:effectLst/>
-                <a:latin typeface="Arial" panose="020B0604020202020204" pitchFamily="34" charset="0"/>
-              </a:rPr>
-              <a:t>But when we used the: Elias code 𝑪𝜹, the result shows that the Haar New Transform will be more efficient in almost 80% of the attempts</a:t>
-            </a:r>
-            <a:br>
-              <a:rPr lang="en-US" sz="1200" b="0" i="0" dirty="0">
-                <a:solidFill>
-                  <a:srgbClr val="333333"/>
-                </a:solidFill>
-                <a:effectLst/>
-                <a:latin typeface="Arial" panose="020B0604020202020204" pitchFamily="34" charset="0"/>
-                <a:cs typeface="Arial" panose="020B0604020202020204" pitchFamily="34" charset="0"/>
-              </a:rPr>
-            </a:br>
-            <a:r>
-              <a:rPr lang="en-US" sz="1200" b="0" i="0" dirty="0">
-                <a:solidFill>
-                  <a:srgbClr val="333333"/>
-                </a:solidFill>
-                <a:effectLst/>
-                <a:latin typeface="Arial" panose="020B0604020202020204" pitchFamily="34" charset="0"/>
-                <a:cs typeface="Arial" panose="020B0604020202020204" pitchFamily="34" charset="0"/>
-              </a:rPr>
-              <a:t> </a:t>
-            </a:r>
-            <a:br>
-              <a:rPr lang="en-US" sz="1200" b="0" i="0" dirty="0">
-                <a:solidFill>
-                  <a:srgbClr val="333333"/>
-                </a:solidFill>
-                <a:effectLst/>
-                <a:latin typeface="Arial" panose="020B0604020202020204" pitchFamily="34" charset="0"/>
-                <a:cs typeface="Arial" panose="020B0604020202020204" pitchFamily="34" charset="0"/>
-              </a:rPr>
-            </a:br>
-            <a:r>
-              <a:rPr lang="en-US" sz="800" dirty="0">
-                <a:solidFill>
-                  <a:srgbClr val="000000"/>
-                </a:solidFill>
-                <a:effectLst/>
-                <a:latin typeface="Arial" panose="020B0604020202020204" pitchFamily="34" charset="0"/>
-              </a:rPr>
-              <a:t>* in the example at the left corner, you can see the result of running the program on 100k ordered arrays, in the size of 2^3.</a:t>
-            </a:r>
-            <a:endParaRPr lang="en-US" sz="800" dirty="0">
-              <a:effectLst/>
-            </a:endParaRPr>
-          </a:p>
-          <a:p>
-            <a:pPr marL="0" rtl="0" latinLnBrk="0">
-              <a:spcBef>
-                <a:spcPts val="0"/>
-              </a:spcBef>
-              <a:spcAft>
-                <a:spcPts val="0"/>
-              </a:spcAft>
-            </a:pPr>
-            <a:r>
-              <a:rPr lang="en-US" sz="800" dirty="0">
-                <a:solidFill>
-                  <a:srgbClr val="000000"/>
-                </a:solidFill>
-                <a:effectLst/>
-                <a:latin typeface="Arial" panose="020B0604020202020204" pitchFamily="34" charset="0"/>
-              </a:rPr>
-              <a:t>In 79.8% the Haar New Transform  is more efficient and in the rest 20.2% they had the same bit size compressed massage </a:t>
-            </a:r>
-            <a:endParaRPr lang="en-US" sz="800" dirty="0">
-              <a:effectLst/>
-            </a:endParaRPr>
-          </a:p>
-        </p:txBody>
-      </p:sp>
-      <p:pic>
-        <p:nvPicPr>
-          <p:cNvPr id="26" name="תמונה 25">
-            <a:extLst>
-              <a:ext uri="{FF2B5EF4-FFF2-40B4-BE49-F238E27FC236}">
-                <a16:creationId xmlns:a16="http://schemas.microsoft.com/office/drawing/2014/main" id="{F5FC3768-88F9-ADA2-3E03-E5382278FA93}"/>
-              </a:ext>
-            </a:extLst>
-          </p:cNvPr>
-          <p:cNvPicPr>
-            <a:picLocks noChangeAspect="1"/>
-          </p:cNvPicPr>
-          <p:nvPr/>
-        </p:nvPicPr>
-        <p:blipFill>
           <a:blip r:embed="rId5"/>
           <a:stretch>
             <a:fillRect/>
@@ -4847,8 +4604,8 @@
         </p:blipFill>
         <p:spPr>
           <a:xfrm>
-            <a:off x="363315" y="8183946"/>
-            <a:ext cx="1612005" cy="1231609"/>
+            <a:off x="4933643" y="4188912"/>
+            <a:ext cx="1851906" cy="1450419"/>
           </a:xfrm>
           <a:prstGeom prst="rect">
             <a:avLst/>
@@ -4869,7 +4626,7 @@
         </p:nvSpPr>
         <p:spPr>
           <a:xfrm>
-            <a:off x="2531915" y="9438330"/>
+            <a:off x="2611788" y="9565287"/>
             <a:ext cx="2670402" cy="208367"/>
           </a:xfrm>
           <a:prstGeom prst="rect">
@@ -4941,7 +4698,7 @@
         </p:nvSpPr>
         <p:spPr>
           <a:xfrm>
-            <a:off x="2398951" y="9415555"/>
+            <a:off x="2603290" y="9542513"/>
             <a:ext cx="2687397" cy="253916"/>
           </a:xfrm>
           <a:prstGeom prst="rect">
@@ -4976,57 +4733,6 @@
               <a:rPr lang="en-US" sz="1050" dirty="0"/>
               <a:t>)</a:t>
             </a:r>
-          </a:p>
-        </p:txBody>
-      </p:sp>
-      <p:sp>
-        <p:nvSpPr>
-          <p:cNvPr id="33" name="Arrow: Right 14">
-            <a:extLst>
-              <a:ext uri="{FF2B5EF4-FFF2-40B4-BE49-F238E27FC236}">
-                <a16:creationId xmlns:a16="http://schemas.microsoft.com/office/drawing/2014/main" id="{6CD3830D-8A8C-2A44-5F9F-0C0208762F96}"/>
-              </a:ext>
-            </a:extLst>
-          </p:cNvPr>
-          <p:cNvSpPr/>
-          <p:nvPr/>
-        </p:nvSpPr>
-        <p:spPr>
-          <a:xfrm rot="10800000">
-            <a:off x="1748610" y="8820544"/>
-            <a:ext cx="226710" cy="164123"/>
-          </a:xfrm>
-          <a:prstGeom prst="rightArrow">
-            <a:avLst/>
-          </a:prstGeom>
-        </p:spPr>
-        <p:style>
-          <a:lnRef idx="2">
-            <a:schemeClr val="accent1">
-              <a:shade val="50000"/>
-            </a:schemeClr>
-          </a:lnRef>
-          <a:fillRef idx="1">
-            <a:schemeClr val="accent1"/>
-          </a:fillRef>
-          <a:effectRef idx="0">
-            <a:schemeClr val="accent1"/>
-          </a:effectRef>
-          <a:fontRef idx="minor">
-            <a:schemeClr val="lt1"/>
-          </a:fontRef>
-        </p:style>
-        <p:txBody>
-          <a:bodyPr rot="0" spcFirstLastPara="0" vertOverflow="overflow" horzOverflow="overflow" vert="horz" wrap="square" lIns="24882" tIns="12440" rIns="24882" bIns="12440" numCol="1" spcCol="0" rtlCol="0" fromWordArt="0" anchor="ctr" anchorCtr="0" forceAA="0" compatLnSpc="1">
-            <a:prstTxWarp prst="textNoShape">
-              <a:avLst/>
-            </a:prstTxWarp>
-            <a:noAutofit/>
-          </a:bodyPr>
-          <a:lstStyle/>
-          <a:p>
-            <a:pPr algn="r" rtl="1"/>
-            <a:endParaRPr lang="en-US" sz="490"/>
           </a:p>
         </p:txBody>
       </p:sp>
@@ -5081,13 +4787,13 @@
           <p:nvPr>
             <p:extLst>
               <p:ext uri="{D42A27DB-BD31-4B8C-83A1-F6EECF244321}">
-                <p14:modId xmlns:p14="http://schemas.microsoft.com/office/powerpoint/2010/main" val="2096382133"/>
+                <p14:modId xmlns:p14="http://schemas.microsoft.com/office/powerpoint/2010/main" val="1805272764"/>
               </p:ext>
             </p:extLst>
           </p:nvPr>
         </p:nvGraphicFramePr>
         <p:xfrm>
-          <a:off x="121537" y="4273341"/>
+          <a:off x="166597" y="4124487"/>
           <a:ext cx="2817788" cy="1007677"/>
         </p:xfrm>
         <a:graphic>
@@ -5162,12 +4868,12 @@
                         </a:spcAft>
                       </a:pPr>
                       <a:r>
-                        <a:rPr lang="en-US" sz="1100">
+                        <a:rPr lang="en-US" sz="1100" dirty="0">
                           <a:effectLst/>
                         </a:rPr>
                         <a:t>compression algorithms :</a:t>
                       </a:r>
-                      <a:endParaRPr lang="en-US" sz="1100">
+                      <a:endParaRPr lang="en-US" sz="1100" dirty="0">
                         <a:effectLst/>
                         <a:latin typeface="Calibri" panose="020F0502020204030204" pitchFamily="34" charset="0"/>
                         <a:ea typeface="Calibri" panose="020F0502020204030204" pitchFamily="34" charset="0"/>
@@ -5313,12 +5019,12 @@
                         </a:spcAft>
                       </a:pPr>
                       <a:r>
-                        <a:rPr lang="en-US" sz="1100" u="sng" dirty="0">
+                        <a:rPr lang="en-US" sz="1100" u="none" dirty="0">
                           <a:effectLst/>
                         </a:rPr>
                         <a:t>Haar New Transform</a:t>
                       </a:r>
-                      <a:endParaRPr lang="en-US" sz="1100" dirty="0">
+                      <a:endParaRPr lang="en-US" sz="1100" u="none" dirty="0">
                         <a:effectLst/>
                         <a:latin typeface="Calibri" panose="020F0502020204030204" pitchFamily="34" charset="0"/>
                         <a:ea typeface="Calibri" panose="020F0502020204030204" pitchFamily="34" charset="0"/>
@@ -5348,6 +5054,1753 @@
           </a:graphicData>
         </a:graphic>
       </p:graphicFrame>
+      <p:pic>
+        <p:nvPicPr>
+          <p:cNvPr id="9" name="תמונה 8">
+            <a:extLst>
+              <a:ext uri="{FF2B5EF4-FFF2-40B4-BE49-F238E27FC236}">
+                <a16:creationId xmlns:a16="http://schemas.microsoft.com/office/drawing/2014/main" id="{390C8447-A05E-F164-7728-C7F00286A420}"/>
+              </a:ext>
+            </a:extLst>
+          </p:cNvPr>
+          <p:cNvPicPr>
+            <a:picLocks noChangeAspect="1"/>
+          </p:cNvPicPr>
+          <p:nvPr/>
+        </p:nvPicPr>
+        <p:blipFill>
+          <a:blip r:embed="rId7"/>
+          <a:stretch>
+            <a:fillRect/>
+          </a:stretch>
+        </p:blipFill>
+        <p:spPr>
+          <a:xfrm>
+            <a:off x="437143" y="7150526"/>
+            <a:ext cx="1475463" cy="118787"/>
+          </a:xfrm>
+          <a:prstGeom prst="rect">
+            <a:avLst/>
+          </a:prstGeom>
+        </p:spPr>
+      </p:pic>
+      <p:sp>
+        <p:nvSpPr>
+          <p:cNvPr id="10" name="תיבת טקסט 9">
+            <a:extLst>
+              <a:ext uri="{FF2B5EF4-FFF2-40B4-BE49-F238E27FC236}">
+                <a16:creationId xmlns:a16="http://schemas.microsoft.com/office/drawing/2014/main" id="{AA55D936-FF51-0410-300D-75A20C5E0F9E}"/>
+              </a:ext>
+            </a:extLst>
+          </p:cNvPr>
+          <p:cNvSpPr txBox="1"/>
+          <p:nvPr/>
+        </p:nvSpPr>
+        <p:spPr>
+          <a:xfrm>
+            <a:off x="437143" y="7136618"/>
+            <a:ext cx="1457302" cy="154244"/>
+          </a:xfrm>
+          <a:prstGeom prst="rect">
+            <a:avLst/>
+          </a:prstGeom>
+          <a:noFill/>
+          <a:ln w="28575">
+            <a:solidFill>
+              <a:schemeClr val="accent1"/>
+            </a:solidFill>
+          </a:ln>
+        </p:spPr>
+        <p:txBody>
+          <a:bodyPr wrap="square" rtlCol="0">
+            <a:spAutoFit/>
+          </a:bodyPr>
+          <a:lstStyle/>
+          <a:p>
+            <a:endParaRPr lang="en-US" dirty="0"/>
+          </a:p>
+        </p:txBody>
+      </p:sp>
+      <p:sp>
+        <p:nvSpPr>
+          <p:cNvPr id="11" name="חץ: ימינה 10">
+            <a:extLst>
+              <a:ext uri="{FF2B5EF4-FFF2-40B4-BE49-F238E27FC236}">
+                <a16:creationId xmlns:a16="http://schemas.microsoft.com/office/drawing/2014/main" id="{78B7112A-AD3B-5275-1104-014E5B0E79DC}"/>
+              </a:ext>
+            </a:extLst>
+          </p:cNvPr>
+          <p:cNvSpPr/>
+          <p:nvPr/>
+        </p:nvSpPr>
+        <p:spPr>
+          <a:xfrm>
+            <a:off x="1980540" y="7176078"/>
+            <a:ext cx="639316" cy="145381"/>
+          </a:xfrm>
+          <a:prstGeom prst="rightArrow">
+            <a:avLst/>
+          </a:prstGeom>
+        </p:spPr>
+        <p:style>
+          <a:lnRef idx="2">
+            <a:schemeClr val="accent1">
+              <a:shade val="50000"/>
+            </a:schemeClr>
+          </a:lnRef>
+          <a:fillRef idx="1">
+            <a:schemeClr val="accent1"/>
+          </a:fillRef>
+          <a:effectRef idx="0">
+            <a:schemeClr val="accent1"/>
+          </a:effectRef>
+          <a:fontRef idx="minor">
+            <a:schemeClr val="lt1"/>
+          </a:fontRef>
+        </p:style>
+        <p:txBody>
+          <a:bodyPr rtlCol="0" anchor="ctr"/>
+          <a:lstStyle/>
+          <a:p>
+            <a:pPr algn="ctr"/>
+            <a:endParaRPr lang="en-US"/>
+          </a:p>
+        </p:txBody>
+      </p:sp>
+      <p:pic>
+        <p:nvPicPr>
+          <p:cNvPr id="22" name="תמונה 21">
+            <a:extLst>
+              <a:ext uri="{FF2B5EF4-FFF2-40B4-BE49-F238E27FC236}">
+                <a16:creationId xmlns:a16="http://schemas.microsoft.com/office/drawing/2014/main" id="{7C265335-37B6-A439-6B94-3DA612505698}"/>
+              </a:ext>
+            </a:extLst>
+          </p:cNvPr>
+          <p:cNvPicPr>
+            <a:picLocks noChangeAspect="1"/>
+          </p:cNvPicPr>
+          <p:nvPr/>
+        </p:nvPicPr>
+        <p:blipFill>
+          <a:blip r:embed="rId8"/>
+          <a:stretch>
+            <a:fillRect/>
+          </a:stretch>
+        </p:blipFill>
+        <p:spPr>
+          <a:xfrm>
+            <a:off x="2708184" y="6876847"/>
+            <a:ext cx="1976233" cy="660155"/>
+          </a:xfrm>
+          <a:prstGeom prst="rect">
+            <a:avLst/>
+          </a:prstGeom>
+        </p:spPr>
+      </p:pic>
+      <p:pic>
+        <p:nvPicPr>
+          <p:cNvPr id="30" name="תמונה 29">
+            <a:extLst>
+              <a:ext uri="{FF2B5EF4-FFF2-40B4-BE49-F238E27FC236}">
+                <a16:creationId xmlns:a16="http://schemas.microsoft.com/office/drawing/2014/main" id="{81E1AD87-4853-2C35-94C6-577ADCF1C458}"/>
+              </a:ext>
+            </a:extLst>
+          </p:cNvPr>
+          <p:cNvPicPr>
+            <a:picLocks noChangeAspect="1"/>
+          </p:cNvPicPr>
+          <p:nvPr/>
+        </p:nvPicPr>
+        <p:blipFill>
+          <a:blip r:embed="rId9"/>
+          <a:stretch>
+            <a:fillRect/>
+          </a:stretch>
+        </p:blipFill>
+        <p:spPr>
+          <a:xfrm>
+            <a:off x="4669131" y="6869799"/>
+            <a:ext cx="2052546" cy="689968"/>
+          </a:xfrm>
+          <a:prstGeom prst="rect">
+            <a:avLst/>
+          </a:prstGeom>
+        </p:spPr>
+      </p:pic>
+      <p:sp>
+        <p:nvSpPr>
+          <p:cNvPr id="32" name="תיבת טקסט 31">
+            <a:extLst>
+              <a:ext uri="{FF2B5EF4-FFF2-40B4-BE49-F238E27FC236}">
+                <a16:creationId xmlns:a16="http://schemas.microsoft.com/office/drawing/2014/main" id="{4501819F-64CC-D255-47C5-F30C52F64D57}"/>
+              </a:ext>
+            </a:extLst>
+          </p:cNvPr>
+          <p:cNvSpPr txBox="1"/>
+          <p:nvPr/>
+        </p:nvSpPr>
+        <p:spPr>
+          <a:xfrm>
+            <a:off x="4676008" y="6742710"/>
+            <a:ext cx="988202" cy="184666"/>
+          </a:xfrm>
+          <a:prstGeom prst="rect">
+            <a:avLst/>
+          </a:prstGeom>
+          <a:noFill/>
+        </p:spPr>
+        <p:txBody>
+          <a:bodyPr wrap="square" rtlCol="0">
+            <a:spAutoFit/>
+          </a:bodyPr>
+          <a:lstStyle/>
+          <a:p>
+            <a:r>
+              <a:rPr lang="en-US" sz="600" b="1" i="1" dirty="0" err="1">
+                <a:solidFill>
+                  <a:schemeClr val="accent1"/>
+                </a:solidFill>
+                <a:effectLst/>
+                <a:latin typeface="Arial" panose="020B0604020202020204" pitchFamily="34" charset="0"/>
+              </a:rPr>
+              <a:t>Haar</a:t>
+            </a:r>
+            <a:r>
+              <a:rPr lang="en-US" sz="600" b="1" i="1" dirty="0">
+                <a:solidFill>
+                  <a:schemeClr val="accent1"/>
+                </a:solidFill>
+                <a:effectLst/>
+                <a:latin typeface="Arial" panose="020B0604020202020204" pitchFamily="34" charset="0"/>
+              </a:rPr>
+              <a:t> New Transform</a:t>
+            </a:r>
+            <a:r>
+              <a:rPr lang="en-US" sz="600" b="1" i="0" strike="noStrike" baseline="0" dirty="0">
+                <a:solidFill>
+                  <a:schemeClr val="accent1"/>
+                </a:solidFill>
+                <a:latin typeface="SFSL1095"/>
+              </a:rPr>
+              <a:t>:</a:t>
+            </a:r>
+            <a:endParaRPr lang="en-US" sz="600" b="1" dirty="0">
+              <a:solidFill>
+                <a:schemeClr val="accent1"/>
+              </a:solidFill>
+            </a:endParaRPr>
+          </a:p>
+        </p:txBody>
+      </p:sp>
+      <p:sp>
+        <p:nvSpPr>
+          <p:cNvPr id="37" name="תיבת טקסט 36">
+            <a:extLst>
+              <a:ext uri="{FF2B5EF4-FFF2-40B4-BE49-F238E27FC236}">
+                <a16:creationId xmlns:a16="http://schemas.microsoft.com/office/drawing/2014/main" id="{05618B04-D8F7-8709-5260-01218EE688D4}"/>
+              </a:ext>
+            </a:extLst>
+          </p:cNvPr>
+          <p:cNvSpPr txBox="1"/>
+          <p:nvPr/>
+        </p:nvSpPr>
+        <p:spPr>
+          <a:xfrm>
+            <a:off x="2648072" y="6730587"/>
+            <a:ext cx="696050" cy="184666"/>
+          </a:xfrm>
+          <a:prstGeom prst="rect">
+            <a:avLst/>
+          </a:prstGeom>
+          <a:noFill/>
+        </p:spPr>
+        <p:txBody>
+          <a:bodyPr wrap="square" rtlCol="0">
+            <a:spAutoFit/>
+          </a:bodyPr>
+          <a:lstStyle/>
+          <a:p>
+            <a:r>
+              <a:rPr lang="en-US" sz="600" b="1" i="0" strike="noStrike" baseline="0" dirty="0">
+                <a:solidFill>
+                  <a:schemeClr val="accent1"/>
+                </a:solidFill>
+                <a:latin typeface="SFSL1095"/>
+              </a:rPr>
+              <a:t>Integer-</a:t>
+            </a:r>
+            <a:r>
+              <a:rPr lang="en-US" sz="600" b="1" i="0" strike="noStrike" baseline="0" dirty="0" err="1">
+                <a:solidFill>
+                  <a:schemeClr val="accent1"/>
+                </a:solidFill>
+                <a:latin typeface="SFSL1095"/>
+              </a:rPr>
+              <a:t>Haar</a:t>
+            </a:r>
+            <a:r>
+              <a:rPr lang="en-US" sz="600" b="1" i="0" strike="noStrike" baseline="0" dirty="0">
+                <a:solidFill>
+                  <a:schemeClr val="accent1"/>
+                </a:solidFill>
+                <a:latin typeface="SFSL1095"/>
+              </a:rPr>
+              <a:t>:</a:t>
+            </a:r>
+            <a:endParaRPr lang="en-US" sz="600" b="1" dirty="0">
+              <a:solidFill>
+                <a:schemeClr val="accent1"/>
+              </a:solidFill>
+            </a:endParaRPr>
+          </a:p>
+        </p:txBody>
+      </p:sp>
+      <p:sp>
+        <p:nvSpPr>
+          <p:cNvPr id="34" name="תיבת טקסט 33">
+            <a:extLst>
+              <a:ext uri="{FF2B5EF4-FFF2-40B4-BE49-F238E27FC236}">
+                <a16:creationId xmlns:a16="http://schemas.microsoft.com/office/drawing/2014/main" id="{C4210229-7C1D-DB97-0619-45ADC98C5627}"/>
+              </a:ext>
+            </a:extLst>
+          </p:cNvPr>
+          <p:cNvSpPr txBox="1"/>
+          <p:nvPr/>
+        </p:nvSpPr>
+        <p:spPr>
+          <a:xfrm>
+            <a:off x="2511290" y="9180722"/>
+            <a:ext cx="3841829" cy="769130"/>
+          </a:xfrm>
+          <a:prstGeom prst="rect">
+            <a:avLst/>
+          </a:prstGeom>
+          <a:noFill/>
+          <a:ln w="12700">
+            <a:solidFill>
+              <a:schemeClr val="accent1"/>
+            </a:solidFill>
+          </a:ln>
+        </p:spPr>
+        <p:txBody>
+          <a:bodyPr wrap="square" rtlCol="0">
+            <a:spAutoFit/>
+          </a:bodyPr>
+          <a:lstStyle/>
+          <a:p>
+            <a:endParaRPr lang="en-US" dirty="0"/>
+          </a:p>
+        </p:txBody>
+      </p:sp>
+      <p:sp>
+        <p:nvSpPr>
+          <p:cNvPr id="39" name="תיבת טקסט 38">
+            <a:extLst>
+              <a:ext uri="{FF2B5EF4-FFF2-40B4-BE49-F238E27FC236}">
+                <a16:creationId xmlns:a16="http://schemas.microsoft.com/office/drawing/2014/main" id="{75713DEC-AB2F-4F35-3570-1D0AC97B0784}"/>
+              </a:ext>
+            </a:extLst>
+          </p:cNvPr>
+          <p:cNvSpPr txBox="1"/>
+          <p:nvPr/>
+        </p:nvSpPr>
+        <p:spPr>
+          <a:xfrm>
+            <a:off x="2682673" y="6747769"/>
+            <a:ext cx="2018682" cy="794637"/>
+          </a:xfrm>
+          <a:prstGeom prst="rect">
+            <a:avLst/>
+          </a:prstGeom>
+          <a:noFill/>
+          <a:ln>
+            <a:solidFill>
+              <a:schemeClr val="accent1"/>
+            </a:solidFill>
+          </a:ln>
+        </p:spPr>
+        <p:txBody>
+          <a:bodyPr wrap="square" rtlCol="0">
+            <a:spAutoFit/>
+          </a:bodyPr>
+          <a:lstStyle/>
+          <a:p>
+            <a:endParaRPr lang="en-US" dirty="0"/>
+          </a:p>
+        </p:txBody>
+      </p:sp>
+      <p:sp>
+        <p:nvSpPr>
+          <p:cNvPr id="40" name="תיבת טקסט 39">
+            <a:extLst>
+              <a:ext uri="{FF2B5EF4-FFF2-40B4-BE49-F238E27FC236}">
+                <a16:creationId xmlns:a16="http://schemas.microsoft.com/office/drawing/2014/main" id="{16715C6A-BEE1-D487-8BE5-7A98AF5BCEE5}"/>
+              </a:ext>
+            </a:extLst>
+          </p:cNvPr>
+          <p:cNvSpPr txBox="1"/>
+          <p:nvPr/>
+        </p:nvSpPr>
+        <p:spPr>
+          <a:xfrm>
+            <a:off x="4713892" y="6705162"/>
+            <a:ext cx="2040717" cy="879852"/>
+          </a:xfrm>
+          <a:prstGeom prst="rect">
+            <a:avLst/>
+          </a:prstGeom>
+          <a:noFill/>
+          <a:ln>
+            <a:solidFill>
+              <a:schemeClr val="accent1"/>
+            </a:solidFill>
+          </a:ln>
+        </p:spPr>
+        <p:txBody>
+          <a:bodyPr wrap="square" rtlCol="0">
+            <a:spAutoFit/>
+          </a:bodyPr>
+          <a:lstStyle/>
+          <a:p>
+            <a:endParaRPr lang="en-US" dirty="0"/>
+          </a:p>
+        </p:txBody>
+      </p:sp>
+      <p:sp>
+        <p:nvSpPr>
+          <p:cNvPr id="41" name="חץ: למטה 40">
+            <a:extLst>
+              <a:ext uri="{FF2B5EF4-FFF2-40B4-BE49-F238E27FC236}">
+                <a16:creationId xmlns:a16="http://schemas.microsoft.com/office/drawing/2014/main" id="{3D45D43E-BA1B-F5B3-82A6-3936B3CA916A}"/>
+              </a:ext>
+            </a:extLst>
+          </p:cNvPr>
+          <p:cNvSpPr/>
+          <p:nvPr/>
+        </p:nvSpPr>
+        <p:spPr>
+          <a:xfrm>
+            <a:off x="5836802" y="7663177"/>
+            <a:ext cx="181975" cy="200931"/>
+          </a:xfrm>
+          <a:prstGeom prst="downArrow">
+            <a:avLst/>
+          </a:prstGeom>
+        </p:spPr>
+        <p:style>
+          <a:lnRef idx="2">
+            <a:schemeClr val="accent1">
+              <a:shade val="50000"/>
+            </a:schemeClr>
+          </a:lnRef>
+          <a:fillRef idx="1">
+            <a:schemeClr val="accent1"/>
+          </a:fillRef>
+          <a:effectRef idx="0">
+            <a:schemeClr val="accent1"/>
+          </a:effectRef>
+          <a:fontRef idx="minor">
+            <a:schemeClr val="lt1"/>
+          </a:fontRef>
+        </p:style>
+        <p:txBody>
+          <a:bodyPr rtlCol="0" anchor="ctr"/>
+          <a:lstStyle/>
+          <a:p>
+            <a:pPr algn="ctr"/>
+            <a:endParaRPr lang="en-US"/>
+          </a:p>
+        </p:txBody>
+      </p:sp>
+      <p:sp>
+        <p:nvSpPr>
+          <p:cNvPr id="43" name="תיבת טקסט 42">
+            <a:extLst>
+              <a:ext uri="{FF2B5EF4-FFF2-40B4-BE49-F238E27FC236}">
+                <a16:creationId xmlns:a16="http://schemas.microsoft.com/office/drawing/2014/main" id="{1CEF0392-AAA6-E2A3-22D8-968F8542214B}"/>
+              </a:ext>
+            </a:extLst>
+          </p:cNvPr>
+          <p:cNvSpPr txBox="1"/>
+          <p:nvPr/>
+        </p:nvSpPr>
+        <p:spPr>
+          <a:xfrm>
+            <a:off x="2642236" y="6705162"/>
+            <a:ext cx="4143313" cy="926443"/>
+          </a:xfrm>
+          <a:prstGeom prst="rect">
+            <a:avLst/>
+          </a:prstGeom>
+          <a:noFill/>
+          <a:ln w="38100">
+            <a:solidFill>
+              <a:schemeClr val="accent1"/>
+            </a:solidFill>
+          </a:ln>
+        </p:spPr>
+        <p:txBody>
+          <a:bodyPr wrap="square" rtlCol="0">
+            <a:spAutoFit/>
+          </a:bodyPr>
+          <a:lstStyle/>
+          <a:p>
+            <a:endParaRPr lang="en-US" dirty="0"/>
+          </a:p>
+        </p:txBody>
+      </p:sp>
+      <p:graphicFrame>
+        <p:nvGraphicFramePr>
+          <p:cNvPr id="58" name="טבלה 57">
+            <a:extLst>
+              <a:ext uri="{FF2B5EF4-FFF2-40B4-BE49-F238E27FC236}">
+                <a16:creationId xmlns:a16="http://schemas.microsoft.com/office/drawing/2014/main" id="{55A8135B-5488-A08D-716E-F0D0846E3332}"/>
+              </a:ext>
+            </a:extLst>
+          </p:cNvPr>
+          <p:cNvGraphicFramePr>
+            <a:graphicFrameLocks noGrp="1"/>
+          </p:cNvGraphicFramePr>
+          <p:nvPr>
+            <p:extLst>
+              <p:ext uri="{D42A27DB-BD31-4B8C-83A1-F6EECF244321}">
+                <p14:modId xmlns:p14="http://schemas.microsoft.com/office/powerpoint/2010/main" val="3728036311"/>
+              </p:ext>
+            </p:extLst>
+          </p:nvPr>
+        </p:nvGraphicFramePr>
+        <p:xfrm>
+          <a:off x="4255786" y="7881469"/>
+          <a:ext cx="2519810" cy="895994"/>
+        </p:xfrm>
+        <a:graphic>
+          <a:graphicData uri="http://schemas.openxmlformats.org/drawingml/2006/table">
+            <a:tbl>
+              <a:tblPr firstRow="1" firstCol="1" bandRow="1">
+                <a:tableStyleId>{5C22544A-7EE6-4342-B048-85BDC9FD1C3A}</a:tableStyleId>
+              </a:tblPr>
+              <a:tblGrid>
+                <a:gridCol w="1006299">
+                  <a:extLst>
+                    <a:ext uri="{9D8B030D-6E8A-4147-A177-3AD203B41FA5}">
+                      <a16:colId xmlns:a16="http://schemas.microsoft.com/office/drawing/2014/main" val="4031532458"/>
+                    </a:ext>
+                  </a:extLst>
+                </a:gridCol>
+                <a:gridCol w="586096">
+                  <a:extLst>
+                    <a:ext uri="{9D8B030D-6E8A-4147-A177-3AD203B41FA5}">
+                      <a16:colId xmlns:a16="http://schemas.microsoft.com/office/drawing/2014/main" val="1457485924"/>
+                    </a:ext>
+                  </a:extLst>
+                </a:gridCol>
+                <a:gridCol w="358140">
+                  <a:extLst>
+                    <a:ext uri="{9D8B030D-6E8A-4147-A177-3AD203B41FA5}">
+                      <a16:colId xmlns:a16="http://schemas.microsoft.com/office/drawing/2014/main" val="1973839703"/>
+                    </a:ext>
+                  </a:extLst>
+                </a:gridCol>
+                <a:gridCol w="569275">
+                  <a:extLst>
+                    <a:ext uri="{9D8B030D-6E8A-4147-A177-3AD203B41FA5}">
+                      <a16:colId xmlns:a16="http://schemas.microsoft.com/office/drawing/2014/main" val="1906404286"/>
+                    </a:ext>
+                  </a:extLst>
+                </a:gridCol>
+              </a:tblGrid>
+              <a:tr h="387806">
+                <a:tc>
+                  <a:txBody>
+                    <a:bodyPr/>
+                    <a:lstStyle/>
+                    <a:p>
+                      <a:pPr marL="0" marR="0" algn="l">
+                        <a:lnSpc>
+                          <a:spcPct val="107000"/>
+                        </a:lnSpc>
+                        <a:spcBef>
+                          <a:spcPts val="0"/>
+                        </a:spcBef>
+                        <a:spcAft>
+                          <a:spcPts val="0"/>
+                        </a:spcAft>
+                      </a:pPr>
+                      <a:r>
+                        <a:rPr lang="en-US" sz="900" dirty="0">
+                          <a:effectLst/>
+                        </a:rPr>
+                        <a:t>         </a:t>
+                      </a:r>
+                      <a:r>
+                        <a:rPr lang="en-US" sz="500" dirty="0">
+                          <a:effectLst/>
+                        </a:rPr>
+                        <a:t>Compression algorithm</a:t>
+                      </a:r>
+                    </a:p>
+                    <a:p>
+                      <a:pPr marL="0" marR="0" algn="l">
+                        <a:lnSpc>
+                          <a:spcPct val="107000"/>
+                        </a:lnSpc>
+                        <a:spcBef>
+                          <a:spcPts val="0"/>
+                        </a:spcBef>
+                        <a:spcAft>
+                          <a:spcPts val="0"/>
+                        </a:spcAft>
+                      </a:pPr>
+                      <a:br>
+                        <a:rPr lang="en-US" sz="500" dirty="0">
+                          <a:effectLst/>
+                        </a:rPr>
+                      </a:br>
+                      <a:r>
+                        <a:rPr lang="en-US" sz="500" dirty="0" err="1">
+                          <a:effectLst/>
+                        </a:rPr>
+                        <a:t>Haar</a:t>
+                      </a:r>
+                      <a:r>
+                        <a:rPr lang="en-US" sz="500" dirty="0">
+                          <a:effectLst/>
+                        </a:rPr>
+                        <a:t> algorithm</a:t>
+                      </a:r>
+                      <a:endParaRPr lang="en-US" sz="500" dirty="0">
+                        <a:effectLst/>
+                        <a:latin typeface="Calibri" panose="020F0502020204030204" pitchFamily="34" charset="0"/>
+                        <a:ea typeface="Calibri" panose="020F0502020204030204" pitchFamily="34" charset="0"/>
+                        <a:cs typeface="Arial" panose="020B0604020202020204" pitchFamily="34" charset="0"/>
+                      </a:endParaRPr>
+                    </a:p>
+                  </a:txBody>
+                  <a:tcPr marL="68580" marR="68580" marT="0" marB="0"/>
+                </a:tc>
+                <a:tc>
+                  <a:txBody>
+                    <a:bodyPr/>
+                    <a:lstStyle/>
+                    <a:p>
+                      <a:pPr marL="0" marR="0" algn="l">
+                        <a:lnSpc>
+                          <a:spcPct val="107000"/>
+                        </a:lnSpc>
+                        <a:spcBef>
+                          <a:spcPts val="0"/>
+                        </a:spcBef>
+                        <a:spcAft>
+                          <a:spcPts val="0"/>
+                        </a:spcAft>
+                      </a:pPr>
+                      <a:br>
+                        <a:rPr lang="en-US" sz="900" dirty="0">
+                          <a:effectLst/>
+                        </a:rPr>
+                      </a:br>
+                      <a:r>
+                        <a:rPr lang="en-US" sz="600" dirty="0">
+                          <a:effectLst/>
+                        </a:rPr>
+                        <a:t>Elias code 𝑪𝜹  </a:t>
+                      </a:r>
+                      <a:endParaRPr lang="en-US" sz="600" dirty="0">
+                        <a:effectLst/>
+                        <a:latin typeface="Calibri" panose="020F0502020204030204" pitchFamily="34" charset="0"/>
+                        <a:ea typeface="Calibri" panose="020F0502020204030204" pitchFamily="34" charset="0"/>
+                        <a:cs typeface="Arial" panose="020B0604020202020204" pitchFamily="34" charset="0"/>
+                      </a:endParaRPr>
+                    </a:p>
+                  </a:txBody>
+                  <a:tcPr marL="68580" marR="68580" marT="0" marB="0"/>
+                </a:tc>
+                <a:tc>
+                  <a:txBody>
+                    <a:bodyPr/>
+                    <a:lstStyle/>
+                    <a:p>
+                      <a:pPr marL="0" marR="0" algn="l">
+                        <a:lnSpc>
+                          <a:spcPct val="107000"/>
+                        </a:lnSpc>
+                        <a:spcBef>
+                          <a:spcPts val="0"/>
+                        </a:spcBef>
+                        <a:spcAft>
+                          <a:spcPts val="0"/>
+                        </a:spcAft>
+                      </a:pPr>
+                      <a:br>
+                        <a:rPr lang="en-US" sz="900" dirty="0">
+                          <a:effectLst/>
+                        </a:rPr>
+                      </a:br>
+                      <a:r>
+                        <a:rPr lang="en-US" sz="600" dirty="0">
+                          <a:effectLst/>
+                        </a:rPr>
+                        <a:t>binary coding</a:t>
+                      </a:r>
+                      <a:endParaRPr lang="en-US" sz="600" dirty="0">
+                        <a:effectLst/>
+                        <a:latin typeface="Calibri" panose="020F0502020204030204" pitchFamily="34" charset="0"/>
+                        <a:ea typeface="Calibri" panose="020F0502020204030204" pitchFamily="34" charset="0"/>
+                        <a:cs typeface="Arial" panose="020B0604020202020204" pitchFamily="34" charset="0"/>
+                      </a:endParaRPr>
+                    </a:p>
+                  </a:txBody>
+                  <a:tcPr marL="68580" marR="68580" marT="0" marB="0"/>
+                </a:tc>
+                <a:tc>
+                  <a:txBody>
+                    <a:bodyPr/>
+                    <a:lstStyle/>
+                    <a:p>
+                      <a:pPr marL="0" marR="0" algn="l">
+                        <a:lnSpc>
+                          <a:spcPct val="107000"/>
+                        </a:lnSpc>
+                        <a:spcBef>
+                          <a:spcPts val="0"/>
+                        </a:spcBef>
+                        <a:spcAft>
+                          <a:spcPts val="0"/>
+                        </a:spcAft>
+                      </a:pPr>
+                      <a:br>
+                        <a:rPr lang="en-US" sz="900" dirty="0">
+                          <a:effectLst/>
+                        </a:rPr>
+                      </a:br>
+                      <a:r>
+                        <a:rPr lang="en-US" sz="600" dirty="0">
+                          <a:effectLst/>
+                        </a:rPr>
+                        <a:t>unary coding</a:t>
+                      </a:r>
+                      <a:endParaRPr lang="en-US" sz="600" dirty="0">
+                        <a:effectLst/>
+                        <a:latin typeface="Calibri" panose="020F0502020204030204" pitchFamily="34" charset="0"/>
+                        <a:ea typeface="Calibri" panose="020F0502020204030204" pitchFamily="34" charset="0"/>
+                        <a:cs typeface="Arial" panose="020B0604020202020204" pitchFamily="34" charset="0"/>
+                      </a:endParaRPr>
+                    </a:p>
+                  </a:txBody>
+                  <a:tcPr marL="68580" marR="68580" marT="0" marB="0"/>
+                </a:tc>
+                <a:extLst>
+                  <a:ext uri="{0D108BD9-81ED-4DB2-BD59-A6C34878D82A}">
+                    <a16:rowId xmlns:a16="http://schemas.microsoft.com/office/drawing/2014/main" val="562124973"/>
+                  </a:ext>
+                </a:extLst>
+              </a:tr>
+              <a:tr h="192204">
+                <a:tc>
+                  <a:txBody>
+                    <a:bodyPr/>
+                    <a:lstStyle/>
+                    <a:p>
+                      <a:pPr marL="0" marR="0" algn="l">
+                        <a:lnSpc>
+                          <a:spcPct val="107000"/>
+                        </a:lnSpc>
+                        <a:spcBef>
+                          <a:spcPts val="0"/>
+                        </a:spcBef>
+                        <a:spcAft>
+                          <a:spcPts val="0"/>
+                        </a:spcAft>
+                      </a:pPr>
+                      <a:r>
+                        <a:rPr lang="en-US" sz="700" dirty="0" err="1">
+                          <a:effectLst/>
+                        </a:rPr>
+                        <a:t>Haar</a:t>
+                      </a:r>
+                      <a:r>
+                        <a:rPr lang="en-US" sz="700" dirty="0">
+                          <a:effectLst/>
+                        </a:rPr>
+                        <a:t> integer: </a:t>
+                      </a:r>
+                      <a:br>
+                        <a:rPr lang="en-US" sz="700" dirty="0">
+                          <a:effectLst/>
+                        </a:rPr>
+                      </a:br>
+                      <a:r>
+                        <a:rPr lang="en-US" sz="700" dirty="0">
+                          <a:effectLst/>
+                        </a:rPr>
+                        <a:t>bit size</a:t>
+                      </a:r>
+                      <a:endParaRPr lang="en-US" sz="700" dirty="0">
+                        <a:effectLst/>
+                        <a:latin typeface="Calibri" panose="020F0502020204030204" pitchFamily="34" charset="0"/>
+                        <a:ea typeface="Calibri" panose="020F0502020204030204" pitchFamily="34" charset="0"/>
+                        <a:cs typeface="Arial" panose="020B0604020202020204" pitchFamily="34" charset="0"/>
+                      </a:endParaRPr>
+                    </a:p>
+                  </a:txBody>
+                  <a:tcPr marL="68580" marR="68580" marT="0" marB="0"/>
+                </a:tc>
+                <a:tc>
+                  <a:txBody>
+                    <a:bodyPr/>
+                    <a:lstStyle/>
+                    <a:p>
+                      <a:pPr marL="0" marR="0" algn="l">
+                        <a:lnSpc>
+                          <a:spcPct val="107000"/>
+                        </a:lnSpc>
+                        <a:spcBef>
+                          <a:spcPts val="0"/>
+                        </a:spcBef>
+                        <a:spcAft>
+                          <a:spcPts val="0"/>
+                        </a:spcAft>
+                      </a:pPr>
+                      <a:r>
+                        <a:rPr lang="en-US" sz="900" dirty="0">
+                          <a:effectLst/>
+                        </a:rPr>
+                        <a:t>97</a:t>
+                      </a:r>
+                      <a:endParaRPr lang="en-US" sz="1100" dirty="0">
+                        <a:effectLst/>
+                        <a:latin typeface="Calibri" panose="020F0502020204030204" pitchFamily="34" charset="0"/>
+                        <a:ea typeface="Calibri" panose="020F0502020204030204" pitchFamily="34" charset="0"/>
+                        <a:cs typeface="Arial" panose="020B0604020202020204" pitchFamily="34" charset="0"/>
+                      </a:endParaRPr>
+                    </a:p>
+                  </a:txBody>
+                  <a:tcPr marL="68580" marR="68580" marT="0" marB="0"/>
+                </a:tc>
+                <a:tc>
+                  <a:txBody>
+                    <a:bodyPr/>
+                    <a:lstStyle/>
+                    <a:p>
+                      <a:pPr marL="0" marR="0" algn="l">
+                        <a:lnSpc>
+                          <a:spcPct val="107000"/>
+                        </a:lnSpc>
+                        <a:spcBef>
+                          <a:spcPts val="0"/>
+                        </a:spcBef>
+                        <a:spcAft>
+                          <a:spcPts val="0"/>
+                        </a:spcAft>
+                      </a:pPr>
+                      <a:r>
+                        <a:rPr lang="en-US" sz="900">
+                          <a:effectLst/>
+                        </a:rPr>
+                        <a:t>51</a:t>
+                      </a:r>
+                      <a:endParaRPr lang="en-US" sz="1100">
+                        <a:effectLst/>
+                        <a:latin typeface="Calibri" panose="020F0502020204030204" pitchFamily="34" charset="0"/>
+                        <a:ea typeface="Calibri" panose="020F0502020204030204" pitchFamily="34" charset="0"/>
+                        <a:cs typeface="Arial" panose="020B0604020202020204" pitchFamily="34" charset="0"/>
+                      </a:endParaRPr>
+                    </a:p>
+                  </a:txBody>
+                  <a:tcPr marL="68580" marR="68580" marT="0" marB="0"/>
+                </a:tc>
+                <a:tc>
+                  <a:txBody>
+                    <a:bodyPr/>
+                    <a:lstStyle/>
+                    <a:p>
+                      <a:pPr marL="0" marR="0" algn="l">
+                        <a:lnSpc>
+                          <a:spcPct val="107000"/>
+                        </a:lnSpc>
+                        <a:spcBef>
+                          <a:spcPts val="0"/>
+                        </a:spcBef>
+                        <a:spcAft>
+                          <a:spcPts val="0"/>
+                        </a:spcAft>
+                      </a:pPr>
+                      <a:r>
+                        <a:rPr lang="en-US" sz="900" dirty="0">
+                          <a:effectLst/>
+                        </a:rPr>
+                        <a:t>2,062</a:t>
+                      </a:r>
+                      <a:endParaRPr lang="en-US" sz="1100" dirty="0">
+                        <a:effectLst/>
+                        <a:latin typeface="Calibri" panose="020F0502020204030204" pitchFamily="34" charset="0"/>
+                        <a:ea typeface="Calibri" panose="020F0502020204030204" pitchFamily="34" charset="0"/>
+                        <a:cs typeface="Arial" panose="020B0604020202020204" pitchFamily="34" charset="0"/>
+                      </a:endParaRPr>
+                    </a:p>
+                  </a:txBody>
+                  <a:tcPr marL="68580" marR="68580" marT="0" marB="0"/>
+                </a:tc>
+                <a:extLst>
+                  <a:ext uri="{0D108BD9-81ED-4DB2-BD59-A6C34878D82A}">
+                    <a16:rowId xmlns:a16="http://schemas.microsoft.com/office/drawing/2014/main" val="206079145"/>
+                  </a:ext>
+                </a:extLst>
+              </a:tr>
+              <a:tr h="284858">
+                <a:tc>
+                  <a:txBody>
+                    <a:bodyPr/>
+                    <a:lstStyle/>
+                    <a:p>
+                      <a:pPr marL="0" marR="0" algn="l">
+                        <a:lnSpc>
+                          <a:spcPct val="107000"/>
+                        </a:lnSpc>
+                        <a:spcBef>
+                          <a:spcPts val="0"/>
+                        </a:spcBef>
+                        <a:spcAft>
+                          <a:spcPts val="0"/>
+                        </a:spcAft>
+                      </a:pPr>
+                      <a:r>
+                        <a:rPr lang="en-US" sz="700" u="sng" dirty="0" err="1">
+                          <a:effectLst/>
+                        </a:rPr>
+                        <a:t>Haar</a:t>
+                      </a:r>
+                      <a:r>
+                        <a:rPr lang="en-US" sz="700" u="sng" dirty="0">
+                          <a:effectLst/>
+                        </a:rPr>
+                        <a:t> New Transform:</a:t>
+                      </a:r>
+                      <a:br>
+                        <a:rPr lang="en-US" sz="700" u="sng" dirty="0">
+                          <a:effectLst/>
+                        </a:rPr>
+                      </a:br>
+                      <a:r>
+                        <a:rPr lang="en-US" sz="700" u="sng" dirty="0">
+                          <a:effectLst/>
+                        </a:rPr>
+                        <a:t> bit size</a:t>
+                      </a:r>
+                      <a:endParaRPr lang="en-US" sz="700" dirty="0">
+                        <a:effectLst/>
+                        <a:latin typeface="Calibri" panose="020F0502020204030204" pitchFamily="34" charset="0"/>
+                        <a:ea typeface="Calibri" panose="020F0502020204030204" pitchFamily="34" charset="0"/>
+                        <a:cs typeface="Arial" panose="020B0604020202020204" pitchFamily="34" charset="0"/>
+                      </a:endParaRPr>
+                    </a:p>
+                  </a:txBody>
+                  <a:tcPr marL="68580" marR="68580" marT="0" marB="0"/>
+                </a:tc>
+                <a:tc>
+                  <a:txBody>
+                    <a:bodyPr/>
+                    <a:lstStyle/>
+                    <a:p>
+                      <a:pPr marL="0" marR="0" algn="l">
+                        <a:lnSpc>
+                          <a:spcPct val="107000"/>
+                        </a:lnSpc>
+                        <a:spcBef>
+                          <a:spcPts val="0"/>
+                        </a:spcBef>
+                        <a:spcAft>
+                          <a:spcPts val="0"/>
+                        </a:spcAft>
+                      </a:pPr>
+                      <a:r>
+                        <a:rPr lang="en-US" sz="900">
+                          <a:effectLst/>
+                        </a:rPr>
+                        <a:t>87</a:t>
+                      </a:r>
+                      <a:endParaRPr lang="en-US" sz="1100">
+                        <a:effectLst/>
+                        <a:latin typeface="Calibri" panose="020F0502020204030204" pitchFamily="34" charset="0"/>
+                        <a:ea typeface="Calibri" panose="020F0502020204030204" pitchFamily="34" charset="0"/>
+                        <a:cs typeface="Arial" panose="020B0604020202020204" pitchFamily="34" charset="0"/>
+                      </a:endParaRPr>
+                    </a:p>
+                  </a:txBody>
+                  <a:tcPr marL="68580" marR="68580" marT="0" marB="0"/>
+                </a:tc>
+                <a:tc>
+                  <a:txBody>
+                    <a:bodyPr/>
+                    <a:lstStyle/>
+                    <a:p>
+                      <a:pPr marL="0" marR="0" algn="l">
+                        <a:lnSpc>
+                          <a:spcPct val="107000"/>
+                        </a:lnSpc>
+                        <a:spcBef>
+                          <a:spcPts val="0"/>
+                        </a:spcBef>
+                        <a:spcAft>
+                          <a:spcPts val="0"/>
+                        </a:spcAft>
+                      </a:pPr>
+                      <a:r>
+                        <a:rPr lang="en-US" sz="900">
+                          <a:effectLst/>
+                        </a:rPr>
+                        <a:t>51</a:t>
+                      </a:r>
+                      <a:endParaRPr lang="en-US" sz="1100">
+                        <a:effectLst/>
+                        <a:latin typeface="Calibri" panose="020F0502020204030204" pitchFamily="34" charset="0"/>
+                        <a:ea typeface="Calibri" panose="020F0502020204030204" pitchFamily="34" charset="0"/>
+                        <a:cs typeface="Arial" panose="020B0604020202020204" pitchFamily="34" charset="0"/>
+                      </a:endParaRPr>
+                    </a:p>
+                  </a:txBody>
+                  <a:tcPr marL="68580" marR="68580" marT="0" marB="0"/>
+                </a:tc>
+                <a:tc>
+                  <a:txBody>
+                    <a:bodyPr/>
+                    <a:lstStyle/>
+                    <a:p>
+                      <a:pPr marL="0" marR="0" algn="l">
+                        <a:lnSpc>
+                          <a:spcPct val="107000"/>
+                        </a:lnSpc>
+                        <a:spcBef>
+                          <a:spcPts val="0"/>
+                        </a:spcBef>
+                        <a:spcAft>
+                          <a:spcPts val="0"/>
+                        </a:spcAft>
+                      </a:pPr>
+                      <a:r>
+                        <a:rPr lang="en-US" sz="900" dirty="0">
+                          <a:effectLst/>
+                        </a:rPr>
+                        <a:t>14,386</a:t>
+                      </a:r>
+                      <a:endParaRPr lang="en-US" sz="1100" dirty="0">
+                        <a:effectLst/>
+                        <a:latin typeface="Calibri" panose="020F0502020204030204" pitchFamily="34" charset="0"/>
+                        <a:ea typeface="Calibri" panose="020F0502020204030204" pitchFamily="34" charset="0"/>
+                        <a:cs typeface="Arial" panose="020B0604020202020204" pitchFamily="34" charset="0"/>
+                      </a:endParaRPr>
+                    </a:p>
+                  </a:txBody>
+                  <a:tcPr marL="68580" marR="68580" marT="0" marB="0"/>
+                </a:tc>
+                <a:extLst>
+                  <a:ext uri="{0D108BD9-81ED-4DB2-BD59-A6C34878D82A}">
+                    <a16:rowId xmlns:a16="http://schemas.microsoft.com/office/drawing/2014/main" val="3287606008"/>
+                  </a:ext>
+                </a:extLst>
+              </a:tr>
+            </a:tbl>
+          </a:graphicData>
+        </a:graphic>
+      </p:graphicFrame>
+      <p:cxnSp>
+        <p:nvCxnSpPr>
+          <p:cNvPr id="60" name="מחבר ישר 59">
+            <a:extLst>
+              <a:ext uri="{FF2B5EF4-FFF2-40B4-BE49-F238E27FC236}">
+                <a16:creationId xmlns:a16="http://schemas.microsoft.com/office/drawing/2014/main" id="{FE74F668-A5AE-4F02-5A51-385504CC1FC0}"/>
+              </a:ext>
+            </a:extLst>
+          </p:cNvPr>
+          <p:cNvCxnSpPr>
+            <a:cxnSpLocks/>
+          </p:cNvCxnSpPr>
+          <p:nvPr/>
+        </p:nvCxnSpPr>
+        <p:spPr>
+          <a:xfrm>
+            <a:off x="4245833" y="7898725"/>
+            <a:ext cx="1036357" cy="345206"/>
+          </a:xfrm>
+          <a:prstGeom prst="line">
+            <a:avLst/>
+          </a:prstGeom>
+          <a:ln>
+            <a:solidFill>
+              <a:schemeClr val="bg1"/>
+            </a:solidFill>
+          </a:ln>
+        </p:spPr>
+        <p:style>
+          <a:lnRef idx="1">
+            <a:schemeClr val="accent1"/>
+          </a:lnRef>
+          <a:fillRef idx="0">
+            <a:schemeClr val="accent1"/>
+          </a:fillRef>
+          <a:effectRef idx="0">
+            <a:schemeClr val="accent1"/>
+          </a:effectRef>
+          <a:fontRef idx="minor">
+            <a:schemeClr val="tx1"/>
+          </a:fontRef>
+        </p:style>
+      </p:cxnSp>
+      <p:pic>
+        <p:nvPicPr>
+          <p:cNvPr id="63" name="תמונה 62">
+            <a:extLst>
+              <a:ext uri="{FF2B5EF4-FFF2-40B4-BE49-F238E27FC236}">
+                <a16:creationId xmlns:a16="http://schemas.microsoft.com/office/drawing/2014/main" id="{AAE3EFD4-8B7A-D61D-4963-451C6AE57890}"/>
+              </a:ext>
+            </a:extLst>
+          </p:cNvPr>
+          <p:cNvPicPr>
+            <a:picLocks noChangeAspect="1"/>
+          </p:cNvPicPr>
+          <p:nvPr/>
+        </p:nvPicPr>
+        <p:blipFill>
+          <a:blip r:embed="rId10"/>
+          <a:stretch>
+            <a:fillRect/>
+          </a:stretch>
+        </p:blipFill>
+        <p:spPr>
+          <a:xfrm>
+            <a:off x="266485" y="7845427"/>
+            <a:ext cx="1591928" cy="920384"/>
+          </a:xfrm>
+          <a:prstGeom prst="rect">
+            <a:avLst/>
+          </a:prstGeom>
+        </p:spPr>
+      </p:pic>
+      <p:pic>
+        <p:nvPicPr>
+          <p:cNvPr id="65" name="תמונה 64">
+            <a:extLst>
+              <a:ext uri="{FF2B5EF4-FFF2-40B4-BE49-F238E27FC236}">
+                <a16:creationId xmlns:a16="http://schemas.microsoft.com/office/drawing/2014/main" id="{7D6F228C-8C45-6060-E791-3920B7C70769}"/>
+              </a:ext>
+            </a:extLst>
+          </p:cNvPr>
+          <p:cNvPicPr>
+            <a:picLocks noChangeAspect="1"/>
+          </p:cNvPicPr>
+          <p:nvPr/>
+        </p:nvPicPr>
+        <p:blipFill>
+          <a:blip r:embed="rId11"/>
+          <a:stretch>
+            <a:fillRect/>
+          </a:stretch>
+        </p:blipFill>
+        <p:spPr>
+          <a:xfrm>
+            <a:off x="1907674" y="8171637"/>
+            <a:ext cx="1591909" cy="929012"/>
+          </a:xfrm>
+          <a:prstGeom prst="rect">
+            <a:avLst/>
+          </a:prstGeom>
+        </p:spPr>
+      </p:pic>
+      <p:pic>
+        <p:nvPicPr>
+          <p:cNvPr id="67" name="תמונה 66">
+            <a:extLst>
+              <a:ext uri="{FF2B5EF4-FFF2-40B4-BE49-F238E27FC236}">
+                <a16:creationId xmlns:a16="http://schemas.microsoft.com/office/drawing/2014/main" id="{9397ECB9-5758-A191-81B3-8B261CEE7BC3}"/>
+              </a:ext>
+            </a:extLst>
+          </p:cNvPr>
+          <p:cNvPicPr>
+            <a:picLocks noChangeAspect="1"/>
+          </p:cNvPicPr>
+          <p:nvPr/>
+        </p:nvPicPr>
+        <p:blipFill>
+          <a:blip r:embed="rId12"/>
+          <a:stretch>
+            <a:fillRect/>
+          </a:stretch>
+        </p:blipFill>
+        <p:spPr>
+          <a:xfrm>
+            <a:off x="196740" y="8813433"/>
+            <a:ext cx="1682717" cy="1036228"/>
+          </a:xfrm>
+          <a:prstGeom prst="rect">
+            <a:avLst/>
+          </a:prstGeom>
+        </p:spPr>
+      </p:pic>
+      <p:sp>
+        <p:nvSpPr>
+          <p:cNvPr id="71" name="תיבת טקסט 70">
+            <a:extLst>
+              <a:ext uri="{FF2B5EF4-FFF2-40B4-BE49-F238E27FC236}">
+                <a16:creationId xmlns:a16="http://schemas.microsoft.com/office/drawing/2014/main" id="{C20B6973-05F4-9406-F056-DA419740DA1D}"/>
+              </a:ext>
+            </a:extLst>
+          </p:cNvPr>
+          <p:cNvSpPr txBox="1"/>
+          <p:nvPr/>
+        </p:nvSpPr>
+        <p:spPr>
+          <a:xfrm>
+            <a:off x="240783" y="7827542"/>
+            <a:ext cx="1666891" cy="945935"/>
+          </a:xfrm>
+          <a:prstGeom prst="rect">
+            <a:avLst/>
+          </a:prstGeom>
+          <a:noFill/>
+          <a:ln w="12700">
+            <a:solidFill>
+              <a:schemeClr val="accent1"/>
+            </a:solidFill>
+          </a:ln>
+        </p:spPr>
+        <p:txBody>
+          <a:bodyPr wrap="square" rtlCol="0">
+            <a:spAutoFit/>
+          </a:bodyPr>
+          <a:lstStyle/>
+          <a:p>
+            <a:endParaRPr lang="en-US" dirty="0"/>
+          </a:p>
+        </p:txBody>
+      </p:sp>
+      <p:sp>
+        <p:nvSpPr>
+          <p:cNvPr id="72" name="תיבת טקסט 71">
+            <a:extLst>
+              <a:ext uri="{FF2B5EF4-FFF2-40B4-BE49-F238E27FC236}">
+                <a16:creationId xmlns:a16="http://schemas.microsoft.com/office/drawing/2014/main" id="{5D004286-7929-B811-B745-28ABE95BEB56}"/>
+              </a:ext>
+            </a:extLst>
+          </p:cNvPr>
+          <p:cNvSpPr txBox="1"/>
+          <p:nvPr/>
+        </p:nvSpPr>
+        <p:spPr>
+          <a:xfrm>
+            <a:off x="1904548" y="8143344"/>
+            <a:ext cx="1627306" cy="985597"/>
+          </a:xfrm>
+          <a:prstGeom prst="rect">
+            <a:avLst/>
+          </a:prstGeom>
+          <a:noFill/>
+          <a:ln w="12700">
+            <a:solidFill>
+              <a:schemeClr val="accent1"/>
+            </a:solidFill>
+          </a:ln>
+        </p:spPr>
+        <p:txBody>
+          <a:bodyPr wrap="square" rtlCol="0">
+            <a:spAutoFit/>
+          </a:bodyPr>
+          <a:lstStyle/>
+          <a:p>
+            <a:endParaRPr lang="en-US" dirty="0"/>
+          </a:p>
+        </p:txBody>
+      </p:sp>
+      <p:sp>
+        <p:nvSpPr>
+          <p:cNvPr id="73" name="תיבת טקסט 72">
+            <a:extLst>
+              <a:ext uri="{FF2B5EF4-FFF2-40B4-BE49-F238E27FC236}">
+                <a16:creationId xmlns:a16="http://schemas.microsoft.com/office/drawing/2014/main" id="{A77B09CA-3F6D-E66B-FFE4-32751CFB3740}"/>
+              </a:ext>
+            </a:extLst>
+          </p:cNvPr>
+          <p:cNvSpPr txBox="1"/>
+          <p:nvPr/>
+        </p:nvSpPr>
+        <p:spPr>
+          <a:xfrm>
+            <a:off x="217165" y="8791362"/>
+            <a:ext cx="1690509" cy="1072346"/>
+          </a:xfrm>
+          <a:prstGeom prst="rect">
+            <a:avLst/>
+          </a:prstGeom>
+          <a:noFill/>
+          <a:ln w="12700">
+            <a:solidFill>
+              <a:schemeClr val="accent1"/>
+            </a:solidFill>
+          </a:ln>
+        </p:spPr>
+        <p:txBody>
+          <a:bodyPr wrap="square" rtlCol="0">
+            <a:spAutoFit/>
+          </a:bodyPr>
+          <a:lstStyle/>
+          <a:p>
+            <a:endParaRPr lang="en-US" dirty="0"/>
+          </a:p>
+        </p:txBody>
+      </p:sp>
+      <p:sp>
+        <p:nvSpPr>
+          <p:cNvPr id="75" name="חץ: שמאלה-ימינה 74">
+            <a:extLst>
+              <a:ext uri="{FF2B5EF4-FFF2-40B4-BE49-F238E27FC236}">
+                <a16:creationId xmlns:a16="http://schemas.microsoft.com/office/drawing/2014/main" id="{22F7B87B-B4E4-3273-3223-2BB5CDB7A96C}"/>
+              </a:ext>
+            </a:extLst>
+          </p:cNvPr>
+          <p:cNvSpPr/>
+          <p:nvPr/>
+        </p:nvSpPr>
+        <p:spPr>
+          <a:xfrm>
+            <a:off x="3680460" y="8300509"/>
+            <a:ext cx="426720" cy="168007"/>
+          </a:xfrm>
+          <a:prstGeom prst="leftRightArrow">
+            <a:avLst/>
+          </a:prstGeom>
+        </p:spPr>
+        <p:style>
+          <a:lnRef idx="2">
+            <a:schemeClr val="accent1">
+              <a:shade val="50000"/>
+            </a:schemeClr>
+          </a:lnRef>
+          <a:fillRef idx="1">
+            <a:schemeClr val="accent1"/>
+          </a:fillRef>
+          <a:effectRef idx="0">
+            <a:schemeClr val="accent1"/>
+          </a:effectRef>
+          <a:fontRef idx="minor">
+            <a:schemeClr val="lt1"/>
+          </a:fontRef>
+        </p:style>
+        <p:txBody>
+          <a:bodyPr rtlCol="0" anchor="ctr"/>
+          <a:lstStyle/>
+          <a:p>
+            <a:pPr algn="ctr"/>
+            <a:endParaRPr lang="en-US"/>
+          </a:p>
+        </p:txBody>
+      </p:sp>
+      <p:sp>
+        <p:nvSpPr>
+          <p:cNvPr id="76" name="תיבת טקסט 75">
+            <a:extLst>
+              <a:ext uri="{FF2B5EF4-FFF2-40B4-BE49-F238E27FC236}">
+                <a16:creationId xmlns:a16="http://schemas.microsoft.com/office/drawing/2014/main" id="{8D7251EF-81EF-0993-0FE6-1580117FB3D8}"/>
+              </a:ext>
+            </a:extLst>
+          </p:cNvPr>
+          <p:cNvSpPr txBox="1"/>
+          <p:nvPr/>
+        </p:nvSpPr>
+        <p:spPr>
+          <a:xfrm>
+            <a:off x="508337" y="6830709"/>
+            <a:ext cx="910868" cy="230832"/>
+          </a:xfrm>
+          <a:prstGeom prst="rect">
+            <a:avLst/>
+          </a:prstGeom>
+          <a:noFill/>
+          <a:ln>
+            <a:solidFill>
+              <a:schemeClr val="accent1"/>
+            </a:solidFill>
+          </a:ln>
+        </p:spPr>
+        <p:txBody>
+          <a:bodyPr wrap="square" rtlCol="0">
+            <a:spAutoFit/>
+          </a:bodyPr>
+          <a:lstStyle/>
+          <a:p>
+            <a:r>
+              <a:rPr lang="en-US" sz="900" dirty="0">
+                <a:solidFill>
+                  <a:schemeClr val="accent1"/>
+                </a:solidFill>
+              </a:rPr>
+              <a:t>Array example:</a:t>
+            </a:r>
+          </a:p>
+        </p:txBody>
+      </p:sp>
+      <p:sp>
+        <p:nvSpPr>
+          <p:cNvPr id="78" name="תיבת טקסט 77">
+            <a:extLst>
+              <a:ext uri="{FF2B5EF4-FFF2-40B4-BE49-F238E27FC236}">
+                <a16:creationId xmlns:a16="http://schemas.microsoft.com/office/drawing/2014/main" id="{DBAD0773-92B1-AF77-87E2-FBCFC1ECB7CB}"/>
+              </a:ext>
+            </a:extLst>
+          </p:cNvPr>
+          <p:cNvSpPr txBox="1"/>
+          <p:nvPr/>
+        </p:nvSpPr>
+        <p:spPr>
+          <a:xfrm>
+            <a:off x="499220" y="7599682"/>
+            <a:ext cx="1799568" cy="200055"/>
+          </a:xfrm>
+          <a:prstGeom prst="rect">
+            <a:avLst/>
+          </a:prstGeom>
+          <a:noFill/>
+          <a:ln>
+            <a:solidFill>
+              <a:schemeClr val="accent1"/>
+            </a:solidFill>
+          </a:ln>
+        </p:spPr>
+        <p:txBody>
+          <a:bodyPr wrap="square" rtlCol="0">
+            <a:spAutoFit/>
+          </a:bodyPr>
+          <a:lstStyle/>
+          <a:p>
+            <a:r>
+              <a:rPr lang="en-US" sz="700" dirty="0">
+                <a:solidFill>
+                  <a:schemeClr val="accent1"/>
+                </a:solidFill>
+              </a:rPr>
+              <a:t>100K Array(2^3 </a:t>
+            </a:r>
+            <a:r>
+              <a:rPr lang="en-US" sz="700" dirty="0">
+                <a:solidFill>
+                  <a:schemeClr val="accent1"/>
+                </a:solidFill>
+                <a:latin typeface="Assistant" pitchFamily="2" charset="-79"/>
+                <a:cs typeface="Assistant" pitchFamily="2" charset="-79"/>
+              </a:rPr>
+              <a:t>variables)</a:t>
+            </a:r>
+            <a:r>
+              <a:rPr lang="en-US" sz="700" dirty="0">
+                <a:solidFill>
+                  <a:schemeClr val="accent1"/>
+                </a:solidFill>
+              </a:rPr>
+              <a:t> bit size  diagrams</a:t>
+            </a:r>
+          </a:p>
+        </p:txBody>
+      </p:sp>
+      <p:sp>
+        <p:nvSpPr>
+          <p:cNvPr id="79" name="מלבן 78">
+            <a:extLst>
+              <a:ext uri="{FF2B5EF4-FFF2-40B4-BE49-F238E27FC236}">
+                <a16:creationId xmlns:a16="http://schemas.microsoft.com/office/drawing/2014/main" id="{9BF92487-7D17-8541-6650-75DDF018007C}"/>
+              </a:ext>
+            </a:extLst>
+          </p:cNvPr>
+          <p:cNvSpPr/>
+          <p:nvPr/>
+        </p:nvSpPr>
+        <p:spPr>
+          <a:xfrm>
+            <a:off x="1980540" y="9224783"/>
+            <a:ext cx="127660" cy="131099"/>
+          </a:xfrm>
+          <a:prstGeom prst="rect">
+            <a:avLst/>
+          </a:prstGeom>
+          <a:solidFill>
+            <a:schemeClr val="accent1"/>
+          </a:solidFill>
+          <a:ln>
+            <a:solidFill>
+              <a:schemeClr val="bg1"/>
+            </a:solidFill>
+          </a:ln>
+        </p:spPr>
+        <p:style>
+          <a:lnRef idx="2">
+            <a:schemeClr val="accent1">
+              <a:shade val="50000"/>
+            </a:schemeClr>
+          </a:lnRef>
+          <a:fillRef idx="1">
+            <a:schemeClr val="accent1"/>
+          </a:fillRef>
+          <a:effectRef idx="0">
+            <a:schemeClr val="accent1"/>
+          </a:effectRef>
+          <a:fontRef idx="minor">
+            <a:schemeClr val="lt1"/>
+          </a:fontRef>
+        </p:style>
+        <p:txBody>
+          <a:bodyPr rtlCol="0" anchor="ctr"/>
+          <a:lstStyle/>
+          <a:p>
+            <a:pPr algn="ctr"/>
+            <a:endParaRPr lang="en-US"/>
+          </a:p>
+        </p:txBody>
+      </p:sp>
+      <p:sp>
+        <p:nvSpPr>
+          <p:cNvPr id="80" name="מלבן 79">
+            <a:extLst>
+              <a:ext uri="{FF2B5EF4-FFF2-40B4-BE49-F238E27FC236}">
+                <a16:creationId xmlns:a16="http://schemas.microsoft.com/office/drawing/2014/main" id="{E094B73C-97AD-2FDB-28EE-88A58914A178}"/>
+              </a:ext>
+            </a:extLst>
+          </p:cNvPr>
+          <p:cNvSpPr/>
+          <p:nvPr/>
+        </p:nvSpPr>
+        <p:spPr>
+          <a:xfrm>
+            <a:off x="1980540" y="9384174"/>
+            <a:ext cx="127660" cy="131099"/>
+          </a:xfrm>
+          <a:prstGeom prst="rect">
+            <a:avLst/>
+          </a:prstGeom>
+          <a:solidFill>
+            <a:schemeClr val="accent2"/>
+          </a:solidFill>
+          <a:ln>
+            <a:solidFill>
+              <a:schemeClr val="bg1"/>
+            </a:solidFill>
+          </a:ln>
+        </p:spPr>
+        <p:style>
+          <a:lnRef idx="2">
+            <a:schemeClr val="accent1">
+              <a:shade val="50000"/>
+            </a:schemeClr>
+          </a:lnRef>
+          <a:fillRef idx="1">
+            <a:schemeClr val="accent1"/>
+          </a:fillRef>
+          <a:effectRef idx="0">
+            <a:schemeClr val="accent1"/>
+          </a:effectRef>
+          <a:fontRef idx="minor">
+            <a:schemeClr val="lt1"/>
+          </a:fontRef>
+        </p:style>
+        <p:txBody>
+          <a:bodyPr rtlCol="0" anchor="ctr"/>
+          <a:lstStyle/>
+          <a:p>
+            <a:pPr algn="ctr"/>
+            <a:endParaRPr lang="en-US"/>
+          </a:p>
+        </p:txBody>
+      </p:sp>
+      <p:sp>
+        <p:nvSpPr>
+          <p:cNvPr id="81" name="מלבן 80">
+            <a:extLst>
+              <a:ext uri="{FF2B5EF4-FFF2-40B4-BE49-F238E27FC236}">
+                <a16:creationId xmlns:a16="http://schemas.microsoft.com/office/drawing/2014/main" id="{00008970-B621-B614-3C8E-F61F3E151A30}"/>
+              </a:ext>
+            </a:extLst>
+          </p:cNvPr>
+          <p:cNvSpPr/>
+          <p:nvPr/>
+        </p:nvSpPr>
+        <p:spPr>
+          <a:xfrm>
+            <a:off x="1980540" y="9548209"/>
+            <a:ext cx="127660" cy="121262"/>
+          </a:xfrm>
+          <a:prstGeom prst="rect">
+            <a:avLst/>
+          </a:prstGeom>
+          <a:solidFill>
+            <a:srgbClr val="389841"/>
+          </a:solidFill>
+          <a:ln>
+            <a:solidFill>
+              <a:schemeClr val="bg1"/>
+            </a:solidFill>
+          </a:ln>
+        </p:spPr>
+        <p:style>
+          <a:lnRef idx="2">
+            <a:schemeClr val="accent1">
+              <a:shade val="50000"/>
+            </a:schemeClr>
+          </a:lnRef>
+          <a:fillRef idx="1">
+            <a:schemeClr val="accent1"/>
+          </a:fillRef>
+          <a:effectRef idx="0">
+            <a:schemeClr val="accent1"/>
+          </a:effectRef>
+          <a:fontRef idx="minor">
+            <a:schemeClr val="lt1"/>
+          </a:fontRef>
+        </p:style>
+        <p:txBody>
+          <a:bodyPr rtlCol="0" anchor="ctr"/>
+          <a:lstStyle/>
+          <a:p>
+            <a:pPr algn="ctr"/>
+            <a:endParaRPr lang="en-US"/>
+          </a:p>
+        </p:txBody>
+      </p:sp>
+      <p:sp>
+        <p:nvSpPr>
+          <p:cNvPr id="82" name="תיבת טקסט 81">
+            <a:extLst>
+              <a:ext uri="{FF2B5EF4-FFF2-40B4-BE49-F238E27FC236}">
+                <a16:creationId xmlns:a16="http://schemas.microsoft.com/office/drawing/2014/main" id="{D547A08D-4467-491A-70CB-E1D85B0CF99A}"/>
+              </a:ext>
+            </a:extLst>
+          </p:cNvPr>
+          <p:cNvSpPr txBox="1"/>
+          <p:nvPr/>
+        </p:nvSpPr>
+        <p:spPr>
+          <a:xfrm>
+            <a:off x="2022909" y="9367085"/>
+            <a:ext cx="424252" cy="169277"/>
+          </a:xfrm>
+          <a:prstGeom prst="rect">
+            <a:avLst/>
+          </a:prstGeom>
+          <a:noFill/>
+        </p:spPr>
+        <p:txBody>
+          <a:bodyPr wrap="square" rtlCol="0">
+            <a:spAutoFit/>
+          </a:bodyPr>
+          <a:lstStyle/>
+          <a:p>
+            <a:r>
+              <a:rPr lang="en-US" sz="500" dirty="0"/>
+              <a:t> </a:t>
+            </a:r>
+            <a:r>
+              <a:rPr lang="en-US" sz="400" dirty="0"/>
+              <a:t>- Equals</a:t>
+            </a:r>
+          </a:p>
+        </p:txBody>
+      </p:sp>
+      <p:sp>
+        <p:nvSpPr>
+          <p:cNvPr id="83" name="תיבת טקסט 82">
+            <a:extLst>
+              <a:ext uri="{FF2B5EF4-FFF2-40B4-BE49-F238E27FC236}">
+                <a16:creationId xmlns:a16="http://schemas.microsoft.com/office/drawing/2014/main" id="{8182F867-0348-65F4-843E-A23D6A2D2AC5}"/>
+              </a:ext>
+            </a:extLst>
+          </p:cNvPr>
+          <p:cNvSpPr txBox="1"/>
+          <p:nvPr/>
+        </p:nvSpPr>
+        <p:spPr>
+          <a:xfrm>
+            <a:off x="2028852" y="9193808"/>
+            <a:ext cx="539871" cy="169277"/>
+          </a:xfrm>
+          <a:prstGeom prst="rect">
+            <a:avLst/>
+          </a:prstGeom>
+          <a:noFill/>
+        </p:spPr>
+        <p:txBody>
+          <a:bodyPr wrap="square" rtlCol="0">
+            <a:spAutoFit/>
+          </a:bodyPr>
+          <a:lstStyle/>
+          <a:p>
+            <a:r>
+              <a:rPr lang="en-US" sz="500" dirty="0"/>
+              <a:t> </a:t>
+            </a:r>
+            <a:r>
+              <a:rPr lang="en-US" sz="400" dirty="0"/>
+              <a:t>- </a:t>
+            </a:r>
+            <a:r>
+              <a:rPr lang="en-US" sz="400" dirty="0" err="1"/>
+              <a:t>Haar</a:t>
+            </a:r>
+            <a:r>
+              <a:rPr lang="en-US" sz="400" dirty="0"/>
+              <a:t> Integer</a:t>
+            </a:r>
+          </a:p>
+        </p:txBody>
+      </p:sp>
+      <p:sp>
+        <p:nvSpPr>
+          <p:cNvPr id="84" name="תיבת טקסט 83">
+            <a:extLst>
+              <a:ext uri="{FF2B5EF4-FFF2-40B4-BE49-F238E27FC236}">
+                <a16:creationId xmlns:a16="http://schemas.microsoft.com/office/drawing/2014/main" id="{DC5301D3-B7F2-2A2A-5AAA-62B01F8CAEA4}"/>
+              </a:ext>
+            </a:extLst>
+          </p:cNvPr>
+          <p:cNvSpPr txBox="1"/>
+          <p:nvPr/>
+        </p:nvSpPr>
+        <p:spPr>
+          <a:xfrm>
+            <a:off x="2044701" y="9515273"/>
+            <a:ext cx="668947" cy="230832"/>
+          </a:xfrm>
+          <a:prstGeom prst="rect">
+            <a:avLst/>
+          </a:prstGeom>
+          <a:noFill/>
+        </p:spPr>
+        <p:txBody>
+          <a:bodyPr wrap="square" rtlCol="0">
+            <a:spAutoFit/>
+          </a:bodyPr>
+          <a:lstStyle/>
+          <a:p>
+            <a:r>
+              <a:rPr lang="en-US" sz="500" dirty="0"/>
+              <a:t> </a:t>
+            </a:r>
+            <a:r>
+              <a:rPr lang="en-US" sz="400" dirty="0"/>
+              <a:t>- </a:t>
+            </a:r>
+            <a:r>
+              <a:rPr lang="en-US" sz="400" dirty="0" err="1"/>
+              <a:t>Haar</a:t>
+            </a:r>
+            <a:r>
+              <a:rPr lang="en-US" sz="400" dirty="0"/>
+              <a:t> New</a:t>
+            </a:r>
+            <a:br>
+              <a:rPr lang="en-US" sz="400" dirty="0"/>
+            </a:br>
+            <a:r>
+              <a:rPr lang="en-US" sz="400" dirty="0"/>
+              <a:t> Transform</a:t>
+            </a:r>
+          </a:p>
+        </p:txBody>
+      </p:sp>
     </p:spTree>
     <p:extLst>
       <p:ext uri="{BB962C8B-B14F-4D97-AF65-F5344CB8AC3E}">

</xml_diff>